<commit_message>
material clase 6 actualizado
</commit_message>
<xml_diff>
--- a/clase_6/teoria/RNN.E2.pptx
+++ b/clase_6/teoria/RNN.E2.pptx
@@ -27,14 +27,15 @@
     <p:sldId id="327" r:id="rId21"/>
     <p:sldId id="342" r:id="rId22"/>
     <p:sldId id="313" r:id="rId23"/>
-    <p:sldId id="344" r:id="rId24"/>
-    <p:sldId id="345" r:id="rId25"/>
-    <p:sldId id="346" r:id="rId26"/>
-    <p:sldId id="347" r:id="rId27"/>
-    <p:sldId id="348" r:id="rId28"/>
-    <p:sldId id="330" r:id="rId29"/>
-    <p:sldId id="331" r:id="rId30"/>
-    <p:sldId id="295" r:id="rId31"/>
+    <p:sldId id="349" r:id="rId24"/>
+    <p:sldId id="344" r:id="rId25"/>
+    <p:sldId id="345" r:id="rId26"/>
+    <p:sldId id="346" r:id="rId27"/>
+    <p:sldId id="347" r:id="rId28"/>
+    <p:sldId id="348" r:id="rId29"/>
+    <p:sldId id="330" r:id="rId30"/>
+    <p:sldId id="331" r:id="rId31"/>
+    <p:sldId id="295" r:id="rId32"/>
   </p:sldIdLst>
   <p:sldSz cx="12192000" cy="6858000"/>
   <p:notesSz cx="6858000" cy="9144000"/>
@@ -144,7 +145,7 @@
 <file path=ppt/revisionInfo.xml><?xml version="1.0" encoding="utf-8"?>
 <p1510:revInfo xmlns:a="http://schemas.openxmlformats.org/drawingml/2006/main" xmlns:r="http://schemas.openxmlformats.org/officeDocument/2006/relationships" xmlns:p1510="http://schemas.microsoft.com/office/powerpoint/2015/10/main">
   <p1510:revLst>
-    <p1510:client id="{B3688C2D-93B6-447B-A24E-1B4300CC839E}" v="8" dt="2023-04-11T18:47:37.214"/>
+    <p1510:client id="{BBC1F5B9-8030-490E-B43A-698173D0CD76}" v="1" dt="2023-06-02T15:01:58.785"/>
   </p1510:revLst>
 </p1510:revInfo>
 </file>
@@ -1572,6 +1573,69 @@
       </pc:sldChg>
     </pc:docChg>
   </pc:docChgLst>
+  <pc:docChgLst>
+    <pc:chgData name="Marcos Maillot" userId="fa14b39d-e966-4ebb-a436-4f96f84b9577" providerId="ADAL" clId="{BBC1F5B9-8030-490E-B43A-698173D0CD76}"/>
+    <pc:docChg chg="custSel addSld modSld">
+      <pc:chgData name="Marcos Maillot" userId="fa14b39d-e966-4ebb-a436-4f96f84b9577" providerId="ADAL" clId="{BBC1F5B9-8030-490E-B43A-698173D0CD76}" dt="2023-06-02T15:04:16.675" v="22" actId="1076"/>
+      <pc:docMkLst>
+        <pc:docMk/>
+      </pc:docMkLst>
+      <pc:sldChg chg="addSp modSp mod">
+        <pc:chgData name="Marcos Maillot" userId="fa14b39d-e966-4ebb-a436-4f96f84b9577" providerId="ADAL" clId="{BBC1F5B9-8030-490E-B43A-698173D0CD76}" dt="2023-06-02T15:04:16.675" v="22" actId="1076"/>
+        <pc:sldMkLst>
+          <pc:docMk/>
+          <pc:sldMk cId="3456761567" sldId="347"/>
+        </pc:sldMkLst>
+        <pc:spChg chg="add mod">
+          <ac:chgData name="Marcos Maillot" userId="fa14b39d-e966-4ebb-a436-4f96f84b9577" providerId="ADAL" clId="{BBC1F5B9-8030-490E-B43A-698173D0CD76}" dt="2023-06-02T15:03:55.095" v="9" actId="1076"/>
+          <ac:spMkLst>
+            <pc:docMk/>
+            <pc:sldMk cId="3456761567" sldId="347"/>
+            <ac:spMk id="2" creationId="{B10AB5D6-505D-CAA8-8105-8B43A4964934}"/>
+          </ac:spMkLst>
+        </pc:spChg>
+        <pc:spChg chg="add mod">
+          <ac:chgData name="Marcos Maillot" userId="fa14b39d-e966-4ebb-a436-4f96f84b9577" providerId="ADAL" clId="{BBC1F5B9-8030-490E-B43A-698173D0CD76}" dt="2023-06-02T15:04:16.675" v="22" actId="1076"/>
+          <ac:spMkLst>
+            <pc:docMk/>
+            <pc:sldMk cId="3456761567" sldId="347"/>
+            <ac:spMk id="6" creationId="{E8087C9F-A5D4-9287-2F64-0DFD527A245F}"/>
+          </ac:spMkLst>
+        </pc:spChg>
+      </pc:sldChg>
+      <pc:sldChg chg="addSp delSp modSp add mod">
+        <pc:chgData name="Marcos Maillot" userId="fa14b39d-e966-4ebb-a436-4f96f84b9577" providerId="ADAL" clId="{BBC1F5B9-8030-490E-B43A-698173D0CD76}" dt="2023-06-02T15:02:31.695" v="6" actId="14100"/>
+        <pc:sldMkLst>
+          <pc:docMk/>
+          <pc:sldMk cId="2525390603" sldId="349"/>
+        </pc:sldMkLst>
+        <pc:spChg chg="del">
+          <ac:chgData name="Marcos Maillot" userId="fa14b39d-e966-4ebb-a436-4f96f84b9577" providerId="ADAL" clId="{BBC1F5B9-8030-490E-B43A-698173D0CD76}" dt="2023-06-02T15:02:05.145" v="1" actId="478"/>
+          <ac:spMkLst>
+            <pc:docMk/>
+            <pc:sldMk cId="2525390603" sldId="349"/>
+            <ac:spMk id="3" creationId="{EAEDAC00-BDB9-3D0E-313F-A0F6EE49ECEB}"/>
+          </ac:spMkLst>
+        </pc:spChg>
+        <pc:spChg chg="add mod">
+          <ac:chgData name="Marcos Maillot" userId="fa14b39d-e966-4ebb-a436-4f96f84b9577" providerId="ADAL" clId="{BBC1F5B9-8030-490E-B43A-698173D0CD76}" dt="2023-06-02T15:02:31.695" v="6" actId="14100"/>
+          <ac:spMkLst>
+            <pc:docMk/>
+            <pc:sldMk cId="2525390603" sldId="349"/>
+            <ac:spMk id="4" creationId="{7A9074C5-81DC-19FC-02E4-7E6BDFC542ED}"/>
+          </ac:spMkLst>
+        </pc:spChg>
+        <pc:spChg chg="del">
+          <ac:chgData name="Marcos Maillot" userId="fa14b39d-e966-4ebb-a436-4f96f84b9577" providerId="ADAL" clId="{BBC1F5B9-8030-490E-B43A-698173D0CD76}" dt="2023-06-02T15:02:07.919" v="2" actId="478"/>
+          <ac:spMkLst>
+            <pc:docMk/>
+            <pc:sldMk cId="2525390603" sldId="349"/>
+            <ac:spMk id="8" creationId="{42273EB3-AA8C-9E6E-7291-FB420C0C5EAE}"/>
+          </ac:spMkLst>
+        </pc:spChg>
+      </pc:sldChg>
+    </pc:docChg>
+  </pc:docChgLst>
 </pc:chgInfo>
 </file>
 
@@ -1625,7 +1689,7 @@
           <a:noFill/>
           <a:extLst>
             <a:ext uri="{909E8E84-426E-40dd-AFC4-6F175D3DCCD1}">
-              <a14:hiddenFill xmlns:a14="http://schemas.microsoft.com/office/drawing/2010/main" xmlns="">
+              <a14:hiddenFill xmlns="" xmlns:a14="http://schemas.microsoft.com/office/drawing/2010/main">
                 <a:solidFill>
                   <a:srgbClr val="FFFFFF"/>
                 </a:solidFill>
@@ -1685,7 +1749,7 @@
             </a:ln>
             <a:extLst>
               <a:ext uri="{91240B29-F687-4f45-9708-019B960494DF}">
-                <a14:hiddenLine xmlns:a14="http://schemas.microsoft.com/office/drawing/2010/main" xmlns="" w="9525">
+                <a14:hiddenLine xmlns="" xmlns:a14="http://schemas.microsoft.com/office/drawing/2010/main" w="9525">
                   <a:solidFill>
                     <a:srgbClr val="000000"/>
                   </a:solidFill>
@@ -1775,7 +1839,7 @@
             </a:ln>
             <a:extLst>
               <a:ext uri="{91240B29-F687-4f45-9708-019B960494DF}">
-                <a14:hiddenLine xmlns:a14="http://schemas.microsoft.com/office/drawing/2010/main" xmlns="" w="9525">
+                <a14:hiddenLine xmlns="" xmlns:a14="http://schemas.microsoft.com/office/drawing/2010/main" w="9525">
                   <a:solidFill>
                     <a:srgbClr val="000000"/>
                   </a:solidFill>
@@ -1865,7 +1929,7 @@
             </a:ln>
             <a:extLst>
               <a:ext uri="{91240B29-F687-4f45-9708-019B960494DF}">
-                <a14:hiddenLine xmlns:a14="http://schemas.microsoft.com/office/drawing/2010/main" xmlns="" w="9525">
+                <a14:hiddenLine xmlns="" xmlns:a14="http://schemas.microsoft.com/office/drawing/2010/main" w="9525">
                   <a:solidFill>
                     <a:srgbClr val="000000"/>
                   </a:solidFill>
@@ -1899,7 +1963,7 @@
             </a:ln>
             <a:extLst>
               <a:ext uri="{91240B29-F687-4f45-9708-019B960494DF}">
-                <a14:hiddenLine xmlns:a14="http://schemas.microsoft.com/office/drawing/2010/main" xmlns="" w="9525">
+                <a14:hiddenLine xmlns="" xmlns:a14="http://schemas.microsoft.com/office/drawing/2010/main" w="9525">
                   <a:solidFill>
                     <a:srgbClr val="000000"/>
                   </a:solidFill>
@@ -1989,7 +2053,7 @@
             </a:ln>
             <a:extLst>
               <a:ext uri="{91240B29-F687-4f45-9708-019B960494DF}">
-                <a14:hiddenLine xmlns:a14="http://schemas.microsoft.com/office/drawing/2010/main" xmlns="" w="9525">
+                <a14:hiddenLine xmlns="" xmlns:a14="http://schemas.microsoft.com/office/drawing/2010/main" w="9525">
                   <a:solidFill>
                     <a:srgbClr val="000000"/>
                   </a:solidFill>
@@ -2051,7 +2115,7 @@
             </a:ln>
             <a:extLst>
               <a:ext uri="{91240B29-F687-4f45-9708-019B960494DF}">
-                <a14:hiddenLine xmlns:a14="http://schemas.microsoft.com/office/drawing/2010/main" xmlns="" w="9525">
+                <a14:hiddenLine xmlns="" xmlns:a14="http://schemas.microsoft.com/office/drawing/2010/main" w="9525">
                   <a:solidFill>
                     <a:srgbClr val="000000"/>
                   </a:solidFill>
@@ -2113,7 +2177,7 @@
             </a:ln>
             <a:extLst>
               <a:ext uri="{91240B29-F687-4f45-9708-019B960494DF}">
-                <a14:hiddenLine xmlns:a14="http://schemas.microsoft.com/office/drawing/2010/main" xmlns="" w="9525">
+                <a14:hiddenLine xmlns="" xmlns:a14="http://schemas.microsoft.com/office/drawing/2010/main" w="9525">
                   <a:solidFill>
                     <a:srgbClr val="000000"/>
                   </a:solidFill>
@@ -2203,7 +2267,7 @@
             </a:ln>
             <a:extLst>
               <a:ext uri="{91240B29-F687-4f45-9708-019B960494DF}">
-                <a14:hiddenLine xmlns:a14="http://schemas.microsoft.com/office/drawing/2010/main" xmlns="" w="9525">
+                <a14:hiddenLine xmlns="" xmlns:a14="http://schemas.microsoft.com/office/drawing/2010/main" w="9525">
                   <a:solidFill>
                     <a:srgbClr val="000000"/>
                   </a:solidFill>
@@ -2265,7 +2329,7 @@
             </a:ln>
             <a:extLst>
               <a:ext uri="{91240B29-F687-4f45-9708-019B960494DF}">
-                <a14:hiddenLine xmlns:a14="http://schemas.microsoft.com/office/drawing/2010/main" xmlns="" w="9525">
+                <a14:hiddenLine xmlns="" xmlns:a14="http://schemas.microsoft.com/office/drawing/2010/main" w="9525">
                   <a:solidFill>
                     <a:srgbClr val="000000"/>
                   </a:solidFill>
@@ -2327,7 +2391,7 @@
             </a:ln>
             <a:extLst>
               <a:ext uri="{91240B29-F687-4f45-9708-019B960494DF}">
-                <a14:hiddenLine xmlns:a14="http://schemas.microsoft.com/office/drawing/2010/main" xmlns="" w="9525">
+                <a14:hiddenLine xmlns="" xmlns:a14="http://schemas.microsoft.com/office/drawing/2010/main" w="9525">
                   <a:solidFill>
                     <a:srgbClr val="000000"/>
                   </a:solidFill>
@@ -2417,7 +2481,7 @@
             </a:ln>
             <a:extLst>
               <a:ext uri="{91240B29-F687-4f45-9708-019B960494DF}">
-                <a14:hiddenLine xmlns:a14="http://schemas.microsoft.com/office/drawing/2010/main" xmlns="" w="9525">
+                <a14:hiddenLine xmlns="" xmlns:a14="http://schemas.microsoft.com/office/drawing/2010/main" w="9525">
                   <a:solidFill>
                     <a:srgbClr val="000000"/>
                   </a:solidFill>
@@ -2507,7 +2571,7 @@
             </a:ln>
             <a:extLst>
               <a:ext uri="{91240B29-F687-4f45-9708-019B960494DF}">
-                <a14:hiddenLine xmlns:a14="http://schemas.microsoft.com/office/drawing/2010/main" xmlns="" w="9525">
+                <a14:hiddenLine xmlns="" xmlns:a14="http://schemas.microsoft.com/office/drawing/2010/main" w="9525">
                   <a:solidFill>
                     <a:srgbClr val="000000"/>
                   </a:solidFill>
@@ -2569,7 +2633,7 @@
             </a:ln>
             <a:extLst>
               <a:ext uri="{91240B29-F687-4f45-9708-019B960494DF}">
-                <a14:hiddenLine xmlns:a14="http://schemas.microsoft.com/office/drawing/2010/main" xmlns="" w="9525">
+                <a14:hiddenLine xmlns="" xmlns:a14="http://schemas.microsoft.com/office/drawing/2010/main" w="9525">
                   <a:solidFill>
                     <a:srgbClr val="000000"/>
                   </a:solidFill>
@@ -2679,7 +2743,7 @@
             </a:ln>
             <a:extLst>
               <a:ext uri="{91240B29-F687-4f45-9708-019B960494DF}">
-                <a14:hiddenLine xmlns:a14="http://schemas.microsoft.com/office/drawing/2010/main" xmlns="" w="9525">
+                <a14:hiddenLine xmlns="" xmlns:a14="http://schemas.microsoft.com/office/drawing/2010/main" w="9525">
                   <a:solidFill>
                     <a:srgbClr val="000000"/>
                   </a:solidFill>
@@ -2741,7 +2805,7 @@
             </a:ln>
             <a:extLst>
               <a:ext uri="{91240B29-F687-4f45-9708-019B960494DF}">
-                <a14:hiddenLine xmlns:a14="http://schemas.microsoft.com/office/drawing/2010/main" xmlns="" w="9525">
+                <a14:hiddenLine xmlns="" xmlns:a14="http://schemas.microsoft.com/office/drawing/2010/main" w="9525">
                   <a:solidFill>
                     <a:srgbClr val="000000"/>
                   </a:solidFill>
@@ -2831,7 +2895,7 @@
             </a:ln>
             <a:extLst>
               <a:ext uri="{91240B29-F687-4f45-9708-019B960494DF}">
-                <a14:hiddenLine xmlns:a14="http://schemas.microsoft.com/office/drawing/2010/main" xmlns="" w="9525">
+                <a14:hiddenLine xmlns="" xmlns:a14="http://schemas.microsoft.com/office/drawing/2010/main" w="9525">
                   <a:solidFill>
                     <a:srgbClr val="000000"/>
                   </a:solidFill>
@@ -2921,7 +2985,7 @@
             </a:ln>
             <a:extLst>
               <a:ext uri="{91240B29-F687-4f45-9708-019B960494DF}">
-                <a14:hiddenLine xmlns:a14="http://schemas.microsoft.com/office/drawing/2010/main" xmlns="" w="9525">
+                <a14:hiddenLine xmlns="" xmlns:a14="http://schemas.microsoft.com/office/drawing/2010/main" w="9525">
                   <a:solidFill>
                     <a:srgbClr val="000000"/>
                   </a:solidFill>
@@ -2983,7 +3047,7 @@
             </a:ln>
             <a:extLst>
               <a:ext uri="{91240B29-F687-4f45-9708-019B960494DF}">
-                <a14:hiddenLine xmlns:a14="http://schemas.microsoft.com/office/drawing/2010/main" xmlns="" w="9525">
+                <a14:hiddenLine xmlns="" xmlns:a14="http://schemas.microsoft.com/office/drawing/2010/main" w="9525">
                   <a:solidFill>
                     <a:srgbClr val="000000"/>
                   </a:solidFill>
@@ -3073,7 +3137,7 @@
             </a:ln>
             <a:extLst>
               <a:ext uri="{91240B29-F687-4f45-9708-019B960494DF}">
-                <a14:hiddenLine xmlns:a14="http://schemas.microsoft.com/office/drawing/2010/main" xmlns="" w="9525">
+                <a14:hiddenLine xmlns="" xmlns:a14="http://schemas.microsoft.com/office/drawing/2010/main" w="9525">
                   <a:solidFill>
                     <a:srgbClr val="000000"/>
                   </a:solidFill>
@@ -3163,7 +3227,7 @@
             </a:ln>
             <a:extLst>
               <a:ext uri="{91240B29-F687-4f45-9708-019B960494DF}">
-                <a14:hiddenLine xmlns:a14="http://schemas.microsoft.com/office/drawing/2010/main" xmlns="" w="9525">
+                <a14:hiddenLine xmlns="" xmlns:a14="http://schemas.microsoft.com/office/drawing/2010/main" w="9525">
                   <a:solidFill>
                     <a:srgbClr val="000000"/>
                   </a:solidFill>
@@ -3219,7 +3283,7 @@
             </a:ln>
             <a:extLst>
               <a:ext uri="{91240B29-F687-4f45-9708-019B960494DF}">
-                <a14:hiddenLine xmlns:a14="http://schemas.microsoft.com/office/drawing/2010/main" xmlns="" w="9525">
+                <a14:hiddenLine xmlns="" xmlns:a14="http://schemas.microsoft.com/office/drawing/2010/main" w="9525">
                   <a:solidFill>
                     <a:srgbClr val="000000"/>
                   </a:solidFill>
@@ -3309,7 +3373,7 @@
             </a:ln>
             <a:extLst>
               <a:ext uri="{91240B29-F687-4f45-9708-019B960494DF}">
-                <a14:hiddenLine xmlns:a14="http://schemas.microsoft.com/office/drawing/2010/main" xmlns="" w="9525">
+                <a14:hiddenLine xmlns="" xmlns:a14="http://schemas.microsoft.com/office/drawing/2010/main" w="9525">
                   <a:solidFill>
                     <a:srgbClr val="000000"/>
                   </a:solidFill>
@@ -3365,7 +3429,7 @@
             </a:ln>
             <a:extLst>
               <a:ext uri="{91240B29-F687-4f45-9708-019B960494DF}">
-                <a14:hiddenLine xmlns:a14="http://schemas.microsoft.com/office/drawing/2010/main" xmlns="" w="9525">
+                <a14:hiddenLine xmlns="" xmlns:a14="http://schemas.microsoft.com/office/drawing/2010/main" w="9525">
                   <a:solidFill>
                     <a:srgbClr val="000000"/>
                   </a:solidFill>
@@ -3455,7 +3519,7 @@
             </a:ln>
             <a:extLst>
               <a:ext uri="{91240B29-F687-4f45-9708-019B960494DF}">
-                <a14:hiddenLine xmlns:a14="http://schemas.microsoft.com/office/drawing/2010/main" xmlns="" w="9525">
+                <a14:hiddenLine xmlns="" xmlns:a14="http://schemas.microsoft.com/office/drawing/2010/main" w="9525">
                   <a:solidFill>
                     <a:srgbClr val="000000"/>
                   </a:solidFill>
@@ -3523,7 +3587,7 @@
             </a:ln>
             <a:extLst>
               <a:ext uri="{91240B29-F687-4f45-9708-019B960494DF}">
-                <a14:hiddenLine xmlns:a14="http://schemas.microsoft.com/office/drawing/2010/main" xmlns="" w="9525">
+                <a14:hiddenLine xmlns="" xmlns:a14="http://schemas.microsoft.com/office/drawing/2010/main" w="9525">
                   <a:solidFill>
                     <a:srgbClr val="000000"/>
                   </a:solidFill>
@@ -3613,7 +3677,7 @@
             </a:ln>
             <a:extLst>
               <a:ext uri="{91240B29-F687-4f45-9708-019B960494DF}">
-                <a14:hiddenLine xmlns:a14="http://schemas.microsoft.com/office/drawing/2010/main" xmlns="" w="9525">
+                <a14:hiddenLine xmlns="" xmlns:a14="http://schemas.microsoft.com/office/drawing/2010/main" w="9525">
                   <a:solidFill>
                     <a:srgbClr val="000000"/>
                   </a:solidFill>
@@ -3681,7 +3745,7 @@
             </a:ln>
             <a:extLst>
               <a:ext uri="{91240B29-F687-4f45-9708-019B960494DF}">
-                <a14:hiddenLine xmlns:a14="http://schemas.microsoft.com/office/drawing/2010/main" xmlns="" w="9525">
+                <a14:hiddenLine xmlns="" xmlns:a14="http://schemas.microsoft.com/office/drawing/2010/main" w="9525">
                   <a:solidFill>
                     <a:srgbClr val="000000"/>
                   </a:solidFill>
@@ -3771,7 +3835,7 @@
             </a:ln>
             <a:extLst>
               <a:ext uri="{91240B29-F687-4f45-9708-019B960494DF}">
-                <a14:hiddenLine xmlns:a14="http://schemas.microsoft.com/office/drawing/2010/main" xmlns="" w="9525">
+                <a14:hiddenLine xmlns="" xmlns:a14="http://schemas.microsoft.com/office/drawing/2010/main" w="9525">
                   <a:solidFill>
                     <a:srgbClr val="000000"/>
                   </a:solidFill>
@@ -3805,7 +3869,7 @@
             </a:ln>
             <a:extLst>
               <a:ext uri="{91240B29-F687-4f45-9708-019B960494DF}">
-                <a14:hiddenLine xmlns:a14="http://schemas.microsoft.com/office/drawing/2010/main" xmlns="" w="9525">
+                <a14:hiddenLine xmlns="" xmlns:a14="http://schemas.microsoft.com/office/drawing/2010/main" w="9525">
                   <a:solidFill>
                     <a:srgbClr val="000000"/>
                   </a:solidFill>
@@ -3895,7 +3959,7 @@
             </a:ln>
             <a:extLst>
               <a:ext uri="{91240B29-F687-4f45-9708-019B960494DF}">
-                <a14:hiddenLine xmlns:a14="http://schemas.microsoft.com/office/drawing/2010/main" xmlns="" w="9525">
+                <a14:hiddenLine xmlns="" xmlns:a14="http://schemas.microsoft.com/office/drawing/2010/main" w="9525">
                   <a:solidFill>
                     <a:srgbClr val="000000"/>
                   </a:solidFill>
@@ -3957,7 +4021,7 @@
             </a:ln>
             <a:extLst>
               <a:ext uri="{91240B29-F687-4f45-9708-019B960494DF}">
-                <a14:hiddenLine xmlns:a14="http://schemas.microsoft.com/office/drawing/2010/main" xmlns="" w="9525">
+                <a14:hiddenLine xmlns="" xmlns:a14="http://schemas.microsoft.com/office/drawing/2010/main" w="9525">
                   <a:solidFill>
                     <a:srgbClr val="000000"/>
                   </a:solidFill>
@@ -4019,7 +4083,7 @@
             </a:ln>
             <a:extLst>
               <a:ext uri="{91240B29-F687-4f45-9708-019B960494DF}">
-                <a14:hiddenLine xmlns:a14="http://schemas.microsoft.com/office/drawing/2010/main" xmlns="" w="9525">
+                <a14:hiddenLine xmlns="" xmlns:a14="http://schemas.microsoft.com/office/drawing/2010/main" w="9525">
                   <a:solidFill>
                     <a:srgbClr val="000000"/>
                   </a:solidFill>
@@ -4109,7 +4173,7 @@
             </a:ln>
             <a:extLst>
               <a:ext uri="{91240B29-F687-4f45-9708-019B960494DF}">
-                <a14:hiddenLine xmlns:a14="http://schemas.microsoft.com/office/drawing/2010/main" xmlns="" w="9525">
+                <a14:hiddenLine xmlns="" xmlns:a14="http://schemas.microsoft.com/office/drawing/2010/main" w="9525">
                   <a:solidFill>
                     <a:srgbClr val="000000"/>
                   </a:solidFill>
@@ -4177,7 +4241,7 @@
             </a:ln>
             <a:extLst>
               <a:ext uri="{91240B29-F687-4f45-9708-019B960494DF}">
-                <a14:hiddenLine xmlns:a14="http://schemas.microsoft.com/office/drawing/2010/main" xmlns="" w="9525">
+                <a14:hiddenLine xmlns="" xmlns:a14="http://schemas.microsoft.com/office/drawing/2010/main" w="9525">
                   <a:solidFill>
                     <a:srgbClr val="000000"/>
                   </a:solidFill>
@@ -4239,7 +4303,7 @@
             </a:ln>
             <a:extLst>
               <a:ext uri="{91240B29-F687-4f45-9708-019B960494DF}">
-                <a14:hiddenLine xmlns:a14="http://schemas.microsoft.com/office/drawing/2010/main" xmlns="" w="9525">
+                <a14:hiddenLine xmlns="" xmlns:a14="http://schemas.microsoft.com/office/drawing/2010/main" w="9525">
                   <a:solidFill>
                     <a:srgbClr val="000000"/>
                   </a:solidFill>
@@ -4329,7 +4393,7 @@
             </a:ln>
             <a:extLst>
               <a:ext uri="{91240B29-F687-4f45-9708-019B960494DF}">
-                <a14:hiddenLine xmlns:a14="http://schemas.microsoft.com/office/drawing/2010/main" xmlns="" w="9525">
+                <a14:hiddenLine xmlns="" xmlns:a14="http://schemas.microsoft.com/office/drawing/2010/main" w="9525">
                   <a:solidFill>
                     <a:srgbClr val="000000"/>
                   </a:solidFill>
@@ -4391,7 +4455,7 @@
             </a:ln>
             <a:extLst>
               <a:ext uri="{91240B29-F687-4f45-9708-019B960494DF}">
-                <a14:hiddenLine xmlns:a14="http://schemas.microsoft.com/office/drawing/2010/main" xmlns="" w="9525">
+                <a14:hiddenLine xmlns="" xmlns:a14="http://schemas.microsoft.com/office/drawing/2010/main" w="9525">
                   <a:solidFill>
                     <a:srgbClr val="000000"/>
                   </a:solidFill>
@@ -4481,7 +4545,7 @@
             </a:ln>
             <a:extLst>
               <a:ext uri="{91240B29-F687-4f45-9708-019B960494DF}">
-                <a14:hiddenLine xmlns:a14="http://schemas.microsoft.com/office/drawing/2010/main" xmlns="" w="9525">
+                <a14:hiddenLine xmlns="" xmlns:a14="http://schemas.microsoft.com/office/drawing/2010/main" w="9525">
                   <a:solidFill>
                     <a:srgbClr val="000000"/>
                   </a:solidFill>
@@ -4543,7 +4607,7 @@
             </a:ln>
             <a:extLst>
               <a:ext uri="{91240B29-F687-4f45-9708-019B960494DF}">
-                <a14:hiddenLine xmlns:a14="http://schemas.microsoft.com/office/drawing/2010/main" xmlns="" w="9525">
+                <a14:hiddenLine xmlns="" xmlns:a14="http://schemas.microsoft.com/office/drawing/2010/main" w="9525">
                   <a:solidFill>
                     <a:srgbClr val="000000"/>
                   </a:solidFill>
@@ -4633,7 +4697,7 @@
             </a:ln>
             <a:extLst>
               <a:ext uri="{91240B29-F687-4f45-9708-019B960494DF}">
-                <a14:hiddenLine xmlns:a14="http://schemas.microsoft.com/office/drawing/2010/main" xmlns="" w="9525">
+                <a14:hiddenLine xmlns="" xmlns:a14="http://schemas.microsoft.com/office/drawing/2010/main" w="9525">
                   <a:solidFill>
                     <a:srgbClr val="000000"/>
                   </a:solidFill>
@@ -4667,7 +4731,7 @@
             </a:ln>
             <a:extLst>
               <a:ext uri="{91240B29-F687-4f45-9708-019B960494DF}">
-                <a14:hiddenLine xmlns:a14="http://schemas.microsoft.com/office/drawing/2010/main" xmlns="" w="9525">
+                <a14:hiddenLine xmlns="" xmlns:a14="http://schemas.microsoft.com/office/drawing/2010/main" w="9525">
                   <a:solidFill>
                     <a:srgbClr val="000000"/>
                   </a:solidFill>
@@ -4732,7 +4796,7 @@
             </a:ln>
             <a:extLst>
               <a:ext uri="{91240B29-F687-4f45-9708-019B960494DF}">
-                <a14:hiddenLine xmlns:a14="http://schemas.microsoft.com/office/drawing/2010/main" xmlns="" w="9525">
+                <a14:hiddenLine xmlns="" xmlns:a14="http://schemas.microsoft.com/office/drawing/2010/main" w="9525">
                   <a:solidFill>
                     <a:srgbClr val="000000"/>
                   </a:solidFill>
@@ -4822,7 +4886,7 @@
             </a:ln>
             <a:extLst>
               <a:ext uri="{91240B29-F687-4f45-9708-019B960494DF}">
-                <a14:hiddenLine xmlns:a14="http://schemas.microsoft.com/office/drawing/2010/main" xmlns="" w="9525">
+                <a14:hiddenLine xmlns="" xmlns:a14="http://schemas.microsoft.com/office/drawing/2010/main" w="9525">
                   <a:solidFill>
                     <a:srgbClr val="000000"/>
                   </a:solidFill>
@@ -4884,7 +4948,7 @@
             </a:ln>
             <a:extLst>
               <a:ext uri="{91240B29-F687-4f45-9708-019B960494DF}">
-                <a14:hiddenLine xmlns:a14="http://schemas.microsoft.com/office/drawing/2010/main" xmlns="" w="9525">
+                <a14:hiddenLine xmlns="" xmlns:a14="http://schemas.microsoft.com/office/drawing/2010/main" w="9525">
                   <a:solidFill>
                     <a:srgbClr val="000000"/>
                   </a:solidFill>
@@ -4974,7 +5038,7 @@
             </a:ln>
             <a:extLst>
               <a:ext uri="{91240B29-F687-4f45-9708-019B960494DF}">
-                <a14:hiddenLine xmlns:a14="http://schemas.microsoft.com/office/drawing/2010/main" xmlns="" w="9525">
+                <a14:hiddenLine xmlns="" xmlns:a14="http://schemas.microsoft.com/office/drawing/2010/main" w="9525">
                   <a:solidFill>
                     <a:srgbClr val="000000"/>
                   </a:solidFill>
@@ -5064,7 +5128,7 @@
             </a:ln>
             <a:extLst>
               <a:ext uri="{91240B29-F687-4f45-9708-019B960494DF}">
-                <a14:hiddenLine xmlns:a14="http://schemas.microsoft.com/office/drawing/2010/main" xmlns="" w="9525">
+                <a14:hiddenLine xmlns="" xmlns:a14="http://schemas.microsoft.com/office/drawing/2010/main" w="9525">
                   <a:solidFill>
                     <a:srgbClr val="000000"/>
                   </a:solidFill>
@@ -5129,7 +5193,7 @@
             </a:ln>
             <a:extLst>
               <a:ext uri="{91240B29-F687-4f45-9708-019B960494DF}">
-                <a14:hiddenLine xmlns:a14="http://schemas.microsoft.com/office/drawing/2010/main" xmlns="" w="9525">
+                <a14:hiddenLine xmlns="" xmlns:a14="http://schemas.microsoft.com/office/drawing/2010/main" w="9525">
                   <a:solidFill>
                     <a:srgbClr val="000000"/>
                   </a:solidFill>
@@ -5191,7 +5255,7 @@
             </a:ln>
             <a:extLst>
               <a:ext uri="{91240B29-F687-4f45-9708-019B960494DF}">
-                <a14:hiddenLine xmlns:a14="http://schemas.microsoft.com/office/drawing/2010/main" xmlns="" w="9525">
+                <a14:hiddenLine xmlns="" xmlns:a14="http://schemas.microsoft.com/office/drawing/2010/main" w="9525">
                   <a:solidFill>
                     <a:srgbClr val="000000"/>
                   </a:solidFill>
@@ -5281,7 +5345,7 @@
             </a:ln>
             <a:extLst>
               <a:ext uri="{91240B29-F687-4f45-9708-019B960494DF}">
-                <a14:hiddenLine xmlns:a14="http://schemas.microsoft.com/office/drawing/2010/main" xmlns="" w="9525">
+                <a14:hiddenLine xmlns="" xmlns:a14="http://schemas.microsoft.com/office/drawing/2010/main" w="9525">
                   <a:solidFill>
                     <a:srgbClr val="000000"/>
                   </a:solidFill>
@@ -5371,7 +5435,7 @@
             </a:ln>
             <a:extLst>
               <a:ext uri="{91240B29-F687-4f45-9708-019B960494DF}">
-                <a14:hiddenLine xmlns:a14="http://schemas.microsoft.com/office/drawing/2010/main" xmlns="" w="9525">
+                <a14:hiddenLine xmlns="" xmlns:a14="http://schemas.microsoft.com/office/drawing/2010/main" w="9525">
                   <a:solidFill>
                     <a:srgbClr val="000000"/>
                   </a:solidFill>
@@ -5433,7 +5497,7 @@
             </a:ln>
             <a:extLst>
               <a:ext uri="{91240B29-F687-4f45-9708-019B960494DF}">
-                <a14:hiddenLine xmlns:a14="http://schemas.microsoft.com/office/drawing/2010/main" xmlns="" w="9525">
+                <a14:hiddenLine xmlns="" xmlns:a14="http://schemas.microsoft.com/office/drawing/2010/main" w="9525">
                   <a:solidFill>
                     <a:srgbClr val="000000"/>
                   </a:solidFill>
@@ -5553,7 +5617,7 @@
             </a:ln>
             <a:extLst>
               <a:ext uri="{91240B29-F687-4f45-9708-019B960494DF}">
-                <a14:hiddenLine xmlns:a14="http://schemas.microsoft.com/office/drawing/2010/main" xmlns="" w="9525">
+                <a14:hiddenLine xmlns="" xmlns:a14="http://schemas.microsoft.com/office/drawing/2010/main" w="9525">
                   <a:solidFill>
                     <a:srgbClr val="000000"/>
                   </a:solidFill>
@@ -5621,7 +5685,7 @@
             </a:ln>
             <a:extLst>
               <a:ext uri="{91240B29-F687-4f45-9708-019B960494DF}">
-                <a14:hiddenLine xmlns:a14="http://schemas.microsoft.com/office/drawing/2010/main" xmlns="" w="9525">
+                <a14:hiddenLine xmlns="" xmlns:a14="http://schemas.microsoft.com/office/drawing/2010/main" w="9525">
                   <a:solidFill>
                     <a:srgbClr val="000000"/>
                   </a:solidFill>
@@ -5711,7 +5775,7 @@
             </a:ln>
             <a:extLst>
               <a:ext uri="{91240B29-F687-4f45-9708-019B960494DF}">
-                <a14:hiddenLine xmlns:a14="http://schemas.microsoft.com/office/drawing/2010/main" xmlns="" w="9525">
+                <a14:hiddenLine xmlns="" xmlns:a14="http://schemas.microsoft.com/office/drawing/2010/main" w="9525">
                   <a:solidFill>
                     <a:srgbClr val="000000"/>
                   </a:solidFill>
@@ -5851,7 +5915,7 @@
           <a:p>
             <a:fld id="{849DE176-146E-4F1E-BCCE-E46272DCA095}" type="datetimeFigureOut">
               <a:rPr lang="es-AR" smtClean="0"/>
-              <a:t>11/4/2023</a:t>
+              <a:t>2/6/2023</a:t>
             </a:fld>
             <a:endParaRPr lang="es-AR"/>
           </a:p>
@@ -6118,7 +6182,7 @@
           <a:p>
             <a:fld id="{849DE176-146E-4F1E-BCCE-E46272DCA095}" type="datetimeFigureOut">
               <a:rPr lang="es-AR" smtClean="0"/>
-              <a:t>11/4/2023</a:t>
+              <a:t>2/6/2023</a:t>
             </a:fld>
             <a:endParaRPr lang="es-AR"/>
           </a:p>
@@ -6314,7 +6378,7 @@
           <a:p>
             <a:fld id="{849DE176-146E-4F1E-BCCE-E46272DCA095}" type="datetimeFigureOut">
               <a:rPr lang="es-AR" smtClean="0"/>
-              <a:t>11/4/2023</a:t>
+              <a:t>2/6/2023</a:t>
             </a:fld>
             <a:endParaRPr lang="es-AR"/>
           </a:p>
@@ -6577,7 +6641,7 @@
           <a:p>
             <a:fld id="{849DE176-146E-4F1E-BCCE-E46272DCA095}" type="datetimeFigureOut">
               <a:rPr lang="es-AR" smtClean="0"/>
-              <a:t>11/4/2023</a:t>
+              <a:t>2/6/2023</a:t>
             </a:fld>
             <a:endParaRPr lang="es-AR"/>
           </a:p>
@@ -7011,7 +7075,7 @@
           <a:p>
             <a:fld id="{849DE176-146E-4F1E-BCCE-E46272DCA095}" type="datetimeFigureOut">
               <a:rPr lang="es-AR" smtClean="0"/>
-              <a:t>11/4/2023</a:t>
+              <a:t>2/6/2023</a:t>
             </a:fld>
             <a:endParaRPr lang="es-AR"/>
           </a:p>
@@ -7557,7 +7621,7 @@
           <a:p>
             <a:fld id="{849DE176-146E-4F1E-BCCE-E46272DCA095}" type="datetimeFigureOut">
               <a:rPr lang="es-AR" smtClean="0"/>
-              <a:t>11/4/2023</a:t>
+              <a:t>2/6/2023</a:t>
             </a:fld>
             <a:endParaRPr lang="es-AR"/>
           </a:p>
@@ -8277,7 +8341,7 @@
           <a:p>
             <a:fld id="{849DE176-146E-4F1E-BCCE-E46272DCA095}" type="datetimeFigureOut">
               <a:rPr lang="es-AR" smtClean="0"/>
-              <a:t>11/4/2023</a:t>
+              <a:t>2/6/2023</a:t>
             </a:fld>
             <a:endParaRPr lang="es-AR"/>
           </a:p>
@@ -8447,7 +8511,7 @@
           <a:p>
             <a:fld id="{849DE176-146E-4F1E-BCCE-E46272DCA095}" type="datetimeFigureOut">
               <a:rPr lang="es-AR" smtClean="0"/>
-              <a:t>11/4/2023</a:t>
+              <a:t>2/6/2023</a:t>
             </a:fld>
             <a:endParaRPr lang="es-AR"/>
           </a:p>
@@ -8627,7 +8691,7 @@
           <a:p>
             <a:fld id="{849DE176-146E-4F1E-BCCE-E46272DCA095}" type="datetimeFigureOut">
               <a:rPr lang="es-AR" smtClean="0"/>
-              <a:t>11/4/2023</a:t>
+              <a:t>2/6/2023</a:t>
             </a:fld>
             <a:endParaRPr lang="es-AR"/>
           </a:p>
@@ -8797,7 +8861,7 @@
           <a:p>
             <a:fld id="{849DE176-146E-4F1E-BCCE-E46272DCA095}" type="datetimeFigureOut">
               <a:rPr lang="es-AR" smtClean="0"/>
-              <a:t>11/4/2023</a:t>
+              <a:t>2/6/2023</a:t>
             </a:fld>
             <a:endParaRPr lang="es-AR"/>
           </a:p>
@@ -9047,7 +9111,7 @@
           <a:p>
             <a:fld id="{849DE176-146E-4F1E-BCCE-E46272DCA095}" type="datetimeFigureOut">
               <a:rPr lang="es-AR" smtClean="0"/>
-              <a:t>11/4/2023</a:t>
+              <a:t>2/6/2023</a:t>
             </a:fld>
             <a:endParaRPr lang="es-AR"/>
           </a:p>
@@ -9279,7 +9343,7 @@
           <a:p>
             <a:fld id="{849DE176-146E-4F1E-BCCE-E46272DCA095}" type="datetimeFigureOut">
               <a:rPr lang="es-AR" smtClean="0"/>
-              <a:t>11/4/2023</a:t>
+              <a:t>2/6/2023</a:t>
             </a:fld>
             <a:endParaRPr lang="es-AR"/>
           </a:p>
@@ -9660,7 +9724,7 @@
           <a:p>
             <a:fld id="{849DE176-146E-4F1E-BCCE-E46272DCA095}" type="datetimeFigureOut">
               <a:rPr lang="es-AR" smtClean="0"/>
-              <a:t>11/4/2023</a:t>
+              <a:t>2/6/2023</a:t>
             </a:fld>
             <a:endParaRPr lang="es-AR"/>
           </a:p>
@@ -9778,7 +9842,7 @@
           <a:p>
             <a:fld id="{849DE176-146E-4F1E-BCCE-E46272DCA095}" type="datetimeFigureOut">
               <a:rPr lang="es-AR" smtClean="0"/>
-              <a:t>11/4/2023</a:t>
+              <a:t>2/6/2023</a:t>
             </a:fld>
             <a:endParaRPr lang="es-AR"/>
           </a:p>
@@ -9873,7 +9937,7 @@
           <a:p>
             <a:fld id="{849DE176-146E-4F1E-BCCE-E46272DCA095}" type="datetimeFigureOut">
               <a:rPr lang="es-AR" smtClean="0"/>
-              <a:t>11/4/2023</a:t>
+              <a:t>2/6/2023</a:t>
             </a:fld>
             <a:endParaRPr lang="es-AR"/>
           </a:p>
@@ -10122,7 +10186,7 @@
           <a:p>
             <a:fld id="{849DE176-146E-4F1E-BCCE-E46272DCA095}" type="datetimeFigureOut">
               <a:rPr lang="es-AR" smtClean="0"/>
-              <a:t>11/4/2023</a:t>
+              <a:t>2/6/2023</a:t>
             </a:fld>
             <a:endParaRPr lang="es-AR"/>
           </a:p>
@@ -10402,7 +10466,7 @@
           <a:p>
             <a:fld id="{849DE176-146E-4F1E-BCCE-E46272DCA095}" type="datetimeFigureOut">
               <a:rPr lang="es-AR" smtClean="0"/>
-              <a:t>11/4/2023</a:t>
+              <a:t>2/6/2023</a:t>
             </a:fld>
             <a:endParaRPr lang="es-AR"/>
           </a:p>
@@ -10542,7 +10606,7 @@
           <a:noFill/>
           <a:extLst>
             <a:ext uri="{909E8E84-426E-40dd-AFC4-6F175D3DCCD1}">
-              <a14:hiddenFill xmlns:a14="http://schemas.microsoft.com/office/drawing/2010/main" xmlns="">
+              <a14:hiddenFill xmlns="" xmlns:a14="http://schemas.microsoft.com/office/drawing/2010/main">
                 <a:solidFill>
                   <a:srgbClr val="FFFFFF"/>
                 </a:solidFill>
@@ -10616,7 +10680,7 @@
               </a:ln>
               <a:extLst>
                 <a:ext uri="{91240B29-F687-4f45-9708-019B960494DF}">
-                  <a14:hiddenLine xmlns:a14="http://schemas.microsoft.com/office/drawing/2010/main" xmlns="" w="9525">
+                  <a14:hiddenLine xmlns="" xmlns:a14="http://schemas.microsoft.com/office/drawing/2010/main" w="9525">
                     <a:solidFill>
                       <a:srgbClr val="000000"/>
                     </a:solidFill>
@@ -10706,7 +10770,7 @@
               </a:ln>
               <a:extLst>
                 <a:ext uri="{91240B29-F687-4f45-9708-019B960494DF}">
-                  <a14:hiddenLine xmlns:a14="http://schemas.microsoft.com/office/drawing/2010/main" xmlns="" w="9525">
+                  <a14:hiddenLine xmlns="" xmlns:a14="http://schemas.microsoft.com/office/drawing/2010/main" w="9525">
                     <a:solidFill>
                       <a:srgbClr val="000000"/>
                     </a:solidFill>
@@ -10796,7 +10860,7 @@
               </a:ln>
               <a:extLst>
                 <a:ext uri="{91240B29-F687-4f45-9708-019B960494DF}">
-                  <a14:hiddenLine xmlns:a14="http://schemas.microsoft.com/office/drawing/2010/main" xmlns="" w="9525">
+                  <a14:hiddenLine xmlns="" xmlns:a14="http://schemas.microsoft.com/office/drawing/2010/main" w="9525">
                     <a:solidFill>
                       <a:srgbClr val="000000"/>
                     </a:solidFill>
@@ -10858,7 +10922,7 @@
               </a:ln>
               <a:extLst>
                 <a:ext uri="{91240B29-F687-4f45-9708-019B960494DF}">
-                  <a14:hiddenLine xmlns:a14="http://schemas.microsoft.com/office/drawing/2010/main" xmlns="" w="9525">
+                  <a14:hiddenLine xmlns="" xmlns:a14="http://schemas.microsoft.com/office/drawing/2010/main" w="9525">
                     <a:solidFill>
                       <a:srgbClr val="000000"/>
                     </a:solidFill>
@@ -10948,7 +11012,7 @@
               </a:ln>
               <a:extLst>
                 <a:ext uri="{91240B29-F687-4f45-9708-019B960494DF}">
-                  <a14:hiddenLine xmlns:a14="http://schemas.microsoft.com/office/drawing/2010/main" xmlns="" w="9525">
+                  <a14:hiddenLine xmlns="" xmlns:a14="http://schemas.microsoft.com/office/drawing/2010/main" w="9525">
                     <a:solidFill>
                       <a:srgbClr val="000000"/>
                     </a:solidFill>
@@ -11010,7 +11074,7 @@
               </a:ln>
               <a:extLst>
                 <a:ext uri="{91240B29-F687-4f45-9708-019B960494DF}">
-                  <a14:hiddenLine xmlns:a14="http://schemas.microsoft.com/office/drawing/2010/main" xmlns="" w="9525">
+                  <a14:hiddenLine xmlns="" xmlns:a14="http://schemas.microsoft.com/office/drawing/2010/main" w="9525">
                     <a:solidFill>
                       <a:srgbClr val="000000"/>
                     </a:solidFill>
@@ -11072,7 +11136,7 @@
               </a:ln>
               <a:extLst>
                 <a:ext uri="{91240B29-F687-4f45-9708-019B960494DF}">
-                  <a14:hiddenLine xmlns:a14="http://schemas.microsoft.com/office/drawing/2010/main" xmlns="" w="9525">
+                  <a14:hiddenLine xmlns="" xmlns:a14="http://schemas.microsoft.com/office/drawing/2010/main" w="9525">
                     <a:solidFill>
                       <a:srgbClr val="000000"/>
                     </a:solidFill>
@@ -11162,7 +11226,7 @@
               </a:ln>
               <a:extLst>
                 <a:ext uri="{91240B29-F687-4f45-9708-019B960494DF}">
-                  <a14:hiddenLine xmlns:a14="http://schemas.microsoft.com/office/drawing/2010/main" xmlns="" w="9525">
+                  <a14:hiddenLine xmlns="" xmlns:a14="http://schemas.microsoft.com/office/drawing/2010/main" w="9525">
                     <a:solidFill>
                       <a:srgbClr val="000000"/>
                     </a:solidFill>
@@ -11252,7 +11316,7 @@
               </a:ln>
               <a:extLst>
                 <a:ext uri="{91240B29-F687-4f45-9708-019B960494DF}">
-                  <a14:hiddenLine xmlns:a14="http://schemas.microsoft.com/office/drawing/2010/main" xmlns="" w="9525">
+                  <a14:hiddenLine xmlns="" xmlns:a14="http://schemas.microsoft.com/office/drawing/2010/main" w="9525">
                     <a:solidFill>
                       <a:srgbClr val="000000"/>
                     </a:solidFill>
@@ -11314,7 +11378,7 @@
               </a:ln>
               <a:extLst>
                 <a:ext uri="{91240B29-F687-4f45-9708-019B960494DF}">
-                  <a14:hiddenLine xmlns:a14="http://schemas.microsoft.com/office/drawing/2010/main" xmlns="" w="9525">
+                  <a14:hiddenLine xmlns="" xmlns:a14="http://schemas.microsoft.com/office/drawing/2010/main" w="9525">
                     <a:solidFill>
                       <a:srgbClr val="000000"/>
                     </a:solidFill>
@@ -11424,7 +11488,7 @@
               </a:ln>
               <a:extLst>
                 <a:ext uri="{91240B29-F687-4f45-9708-019B960494DF}">
-                  <a14:hiddenLine xmlns:a14="http://schemas.microsoft.com/office/drawing/2010/main" xmlns="" w="9525">
+                  <a14:hiddenLine xmlns="" xmlns:a14="http://schemas.microsoft.com/office/drawing/2010/main" w="9525">
                     <a:solidFill>
                       <a:srgbClr val="000000"/>
                     </a:solidFill>
@@ -11508,7 +11572,7 @@
               </a:ln>
               <a:extLst>
                 <a:ext uri="{91240B29-F687-4f45-9708-019B960494DF}">
-                  <a14:hiddenLine xmlns:a14="http://schemas.microsoft.com/office/drawing/2010/main" xmlns="" w="9525">
+                  <a14:hiddenLine xmlns="" xmlns:a14="http://schemas.microsoft.com/office/drawing/2010/main" w="9525">
                     <a:solidFill>
                       <a:srgbClr val="000000"/>
                     </a:solidFill>
@@ -11570,7 +11634,7 @@
               </a:ln>
               <a:extLst>
                 <a:ext uri="{91240B29-F687-4f45-9708-019B960494DF}">
-                  <a14:hiddenLine xmlns:a14="http://schemas.microsoft.com/office/drawing/2010/main" xmlns="" w="9525">
+                  <a14:hiddenLine xmlns="" xmlns:a14="http://schemas.microsoft.com/office/drawing/2010/main" w="9525">
                     <a:solidFill>
                       <a:srgbClr val="000000"/>
                     </a:solidFill>
@@ -11632,7 +11696,7 @@
               </a:ln>
               <a:extLst>
                 <a:ext uri="{91240B29-F687-4f45-9708-019B960494DF}">
-                  <a14:hiddenLine xmlns:a14="http://schemas.microsoft.com/office/drawing/2010/main" xmlns="" w="9525">
+                  <a14:hiddenLine xmlns="" xmlns:a14="http://schemas.microsoft.com/office/drawing/2010/main" w="9525">
                     <a:solidFill>
                       <a:srgbClr val="000000"/>
                     </a:solidFill>
@@ -11722,7 +11786,7 @@
               </a:ln>
               <a:extLst>
                 <a:ext uri="{91240B29-F687-4f45-9708-019B960494DF}">
-                  <a14:hiddenLine xmlns:a14="http://schemas.microsoft.com/office/drawing/2010/main" xmlns="" w="9525">
+                  <a14:hiddenLine xmlns="" xmlns:a14="http://schemas.microsoft.com/office/drawing/2010/main" w="9525">
                     <a:solidFill>
                       <a:srgbClr val="000000"/>
                     </a:solidFill>
@@ -11756,7 +11820,7 @@
               </a:ln>
               <a:extLst>
                 <a:ext uri="{91240B29-F687-4f45-9708-019B960494DF}">
-                  <a14:hiddenLine xmlns:a14="http://schemas.microsoft.com/office/drawing/2010/main" xmlns="" w="9525">
+                  <a14:hiddenLine xmlns="" xmlns:a14="http://schemas.microsoft.com/office/drawing/2010/main" w="9525">
                     <a:solidFill>
                       <a:srgbClr val="000000"/>
                     </a:solidFill>
@@ -11821,7 +11885,7 @@
               </a:ln>
               <a:extLst>
                 <a:ext uri="{91240B29-F687-4f45-9708-019B960494DF}">
-                  <a14:hiddenLine xmlns:a14="http://schemas.microsoft.com/office/drawing/2010/main" xmlns="" w="9525">
+                  <a14:hiddenLine xmlns="" xmlns:a14="http://schemas.microsoft.com/office/drawing/2010/main" w="9525">
                     <a:solidFill>
                       <a:srgbClr val="000000"/>
                     </a:solidFill>
@@ -11911,7 +11975,7 @@
               </a:ln>
               <a:extLst>
                 <a:ext uri="{91240B29-F687-4f45-9708-019B960494DF}">
-                  <a14:hiddenLine xmlns:a14="http://schemas.microsoft.com/office/drawing/2010/main" xmlns="" w="9525">
+                  <a14:hiddenLine xmlns="" xmlns:a14="http://schemas.microsoft.com/office/drawing/2010/main" w="9525">
                     <a:solidFill>
                       <a:srgbClr val="000000"/>
                     </a:solidFill>
@@ -11973,7 +12037,7 @@
               </a:ln>
               <a:extLst>
                 <a:ext uri="{91240B29-F687-4f45-9708-019B960494DF}">
-                  <a14:hiddenLine xmlns:a14="http://schemas.microsoft.com/office/drawing/2010/main" xmlns="" w="9525">
+                  <a14:hiddenLine xmlns="" xmlns:a14="http://schemas.microsoft.com/office/drawing/2010/main" w="9525">
                     <a:solidFill>
                       <a:srgbClr val="000000"/>
                     </a:solidFill>
@@ -12063,7 +12127,7 @@
               </a:ln>
               <a:extLst>
                 <a:ext uri="{91240B29-F687-4f45-9708-019B960494DF}">
-                  <a14:hiddenLine xmlns:a14="http://schemas.microsoft.com/office/drawing/2010/main" xmlns="" w="9525">
+                  <a14:hiddenLine xmlns="" xmlns:a14="http://schemas.microsoft.com/office/drawing/2010/main" w="9525">
                     <a:solidFill>
                       <a:srgbClr val="000000"/>
                     </a:solidFill>
@@ -12128,7 +12192,7 @@
               </a:ln>
               <a:extLst>
                 <a:ext uri="{91240B29-F687-4f45-9708-019B960494DF}">
-                  <a14:hiddenLine xmlns:a14="http://schemas.microsoft.com/office/drawing/2010/main" xmlns="" w="9525">
+                  <a14:hiddenLine xmlns="" xmlns:a14="http://schemas.microsoft.com/office/drawing/2010/main" w="9525">
                     <a:solidFill>
                       <a:srgbClr val="000000"/>
                     </a:solidFill>
@@ -12190,7 +12254,7 @@
               </a:ln>
               <a:extLst>
                 <a:ext uri="{91240B29-F687-4f45-9708-019B960494DF}">
-                  <a14:hiddenLine xmlns:a14="http://schemas.microsoft.com/office/drawing/2010/main" xmlns="" w="9525">
+                  <a14:hiddenLine xmlns="" xmlns:a14="http://schemas.microsoft.com/office/drawing/2010/main" w="9525">
                     <a:solidFill>
                       <a:srgbClr val="000000"/>
                     </a:solidFill>
@@ -12280,7 +12344,7 @@
               </a:ln>
               <a:extLst>
                 <a:ext uri="{91240B29-F687-4f45-9708-019B960494DF}">
-                  <a14:hiddenLine xmlns:a14="http://schemas.microsoft.com/office/drawing/2010/main" xmlns="" w="9525">
+                  <a14:hiddenLine xmlns="" xmlns:a14="http://schemas.microsoft.com/office/drawing/2010/main" w="9525">
                     <a:solidFill>
                       <a:srgbClr val="000000"/>
                     </a:solidFill>
@@ -12370,7 +12434,7 @@
               </a:ln>
               <a:extLst>
                 <a:ext uri="{91240B29-F687-4f45-9708-019B960494DF}">
-                  <a14:hiddenLine xmlns:a14="http://schemas.microsoft.com/office/drawing/2010/main" xmlns="" w="9525">
+                  <a14:hiddenLine xmlns="" xmlns:a14="http://schemas.microsoft.com/office/drawing/2010/main" w="9525">
                     <a:solidFill>
                       <a:srgbClr val="000000"/>
                     </a:solidFill>
@@ -12435,7 +12499,7 @@
               </a:ln>
               <a:extLst>
                 <a:ext uri="{91240B29-F687-4f45-9708-019B960494DF}">
-                  <a14:hiddenLine xmlns:a14="http://schemas.microsoft.com/office/drawing/2010/main" xmlns="" w="9525">
+                  <a14:hiddenLine xmlns="" xmlns:a14="http://schemas.microsoft.com/office/drawing/2010/main" w="9525">
                     <a:solidFill>
                       <a:srgbClr val="000000"/>
                     </a:solidFill>
@@ -12555,7 +12619,7 @@
               </a:ln>
               <a:extLst>
                 <a:ext uri="{91240B29-F687-4f45-9708-019B960494DF}">
-                  <a14:hiddenLine xmlns:a14="http://schemas.microsoft.com/office/drawing/2010/main" xmlns="" w="9525">
+                  <a14:hiddenLine xmlns="" xmlns:a14="http://schemas.microsoft.com/office/drawing/2010/main" w="9525">
                     <a:solidFill>
                       <a:srgbClr val="000000"/>
                     </a:solidFill>
@@ -12653,7 +12717,7 @@
               </a:ln>
               <a:extLst>
                 <a:ext uri="{91240B29-F687-4f45-9708-019B960494DF}">
-                  <a14:hiddenLine xmlns:a14="http://schemas.microsoft.com/office/drawing/2010/main" xmlns="" w="9525">
+                  <a14:hiddenLine xmlns="" xmlns:a14="http://schemas.microsoft.com/office/drawing/2010/main" w="9525">
                     <a:solidFill>
                       <a:srgbClr val="000000"/>
                     </a:solidFill>
@@ -12768,7 +12832,7 @@
               </a:ln>
               <a:extLst>
                 <a:ext uri="{91240B29-F687-4f45-9708-019B960494DF}">
-                  <a14:hiddenLine xmlns:a14="http://schemas.microsoft.com/office/drawing/2010/main" xmlns="" w="9525">
+                  <a14:hiddenLine xmlns="" xmlns:a14="http://schemas.microsoft.com/office/drawing/2010/main" w="9525">
                     <a:solidFill>
                       <a:srgbClr val="000000"/>
                     </a:solidFill>
@@ -12858,7 +12922,7 @@
               </a:ln>
               <a:extLst>
                 <a:ext uri="{91240B29-F687-4f45-9708-019B960494DF}">
-                  <a14:hiddenLine xmlns:a14="http://schemas.microsoft.com/office/drawing/2010/main" xmlns="" w="9525">
+                  <a14:hiddenLine xmlns="" xmlns:a14="http://schemas.microsoft.com/office/drawing/2010/main" w="9525">
                     <a:solidFill>
                       <a:srgbClr val="000000"/>
                     </a:solidFill>
@@ -12923,7 +12987,7 @@
               </a:ln>
               <a:extLst>
                 <a:ext uri="{91240B29-F687-4f45-9708-019B960494DF}">
-                  <a14:hiddenLine xmlns:a14="http://schemas.microsoft.com/office/drawing/2010/main" xmlns="" w="9525">
+                  <a14:hiddenLine xmlns="" xmlns:a14="http://schemas.microsoft.com/office/drawing/2010/main" w="9525">
                     <a:solidFill>
                       <a:srgbClr val="000000"/>
                     </a:solidFill>
@@ -13013,7 +13077,7 @@
               </a:ln>
               <a:extLst>
                 <a:ext uri="{91240B29-F687-4f45-9708-019B960494DF}">
-                  <a14:hiddenLine xmlns:a14="http://schemas.microsoft.com/office/drawing/2010/main" xmlns="" w="9525">
+                  <a14:hiddenLine xmlns="" xmlns:a14="http://schemas.microsoft.com/office/drawing/2010/main" w="9525">
                     <a:solidFill>
                       <a:srgbClr val="000000"/>
                     </a:solidFill>
@@ -13081,7 +13145,7 @@
               </a:ln>
               <a:extLst>
                 <a:ext uri="{91240B29-F687-4f45-9708-019B960494DF}">
-                  <a14:hiddenLine xmlns:a14="http://schemas.microsoft.com/office/drawing/2010/main" xmlns="" w="9525">
+                  <a14:hiddenLine xmlns="" xmlns:a14="http://schemas.microsoft.com/office/drawing/2010/main" w="9525">
                     <a:solidFill>
                       <a:srgbClr val="000000"/>
                     </a:solidFill>
@@ -13171,7 +13235,7 @@
               </a:ln>
               <a:extLst>
                 <a:ext uri="{91240B29-F687-4f45-9708-019B960494DF}">
-                  <a14:hiddenLine xmlns:a14="http://schemas.microsoft.com/office/drawing/2010/main" xmlns="" w="9525">
+                  <a14:hiddenLine xmlns="" xmlns:a14="http://schemas.microsoft.com/office/drawing/2010/main" w="9525">
                     <a:solidFill>
                       <a:srgbClr val="000000"/>
                     </a:solidFill>
@@ -13239,7 +13303,7 @@
               </a:ln>
               <a:extLst>
                 <a:ext uri="{91240B29-F687-4f45-9708-019B960494DF}">
-                  <a14:hiddenLine xmlns:a14="http://schemas.microsoft.com/office/drawing/2010/main" xmlns="" w="9525">
+                  <a14:hiddenLine xmlns="" xmlns:a14="http://schemas.microsoft.com/office/drawing/2010/main" w="9525">
                     <a:solidFill>
                       <a:srgbClr val="000000"/>
                     </a:solidFill>
@@ -13329,7 +13393,7 @@
               </a:ln>
               <a:extLst>
                 <a:ext uri="{91240B29-F687-4f45-9708-019B960494DF}">
-                  <a14:hiddenLine xmlns:a14="http://schemas.microsoft.com/office/drawing/2010/main" xmlns="" w="9525">
+                  <a14:hiddenLine xmlns="" xmlns:a14="http://schemas.microsoft.com/office/drawing/2010/main" w="9525">
                     <a:solidFill>
                       <a:srgbClr val="000000"/>
                     </a:solidFill>
@@ -13363,7 +13427,7 @@
               </a:ln>
               <a:extLst>
                 <a:ext uri="{91240B29-F687-4f45-9708-019B960494DF}">
-                  <a14:hiddenLine xmlns:a14="http://schemas.microsoft.com/office/drawing/2010/main" xmlns="" w="9525">
+                  <a14:hiddenLine xmlns="" xmlns:a14="http://schemas.microsoft.com/office/drawing/2010/main" w="9525">
                     <a:solidFill>
                       <a:srgbClr val="000000"/>
                     </a:solidFill>
@@ -13503,7 +13567,7 @@
           <a:p>
             <a:fld id="{849DE176-146E-4F1E-BCCE-E46272DCA095}" type="datetimeFigureOut">
               <a:rPr lang="es-AR" smtClean="0"/>
-              <a:t>11/4/2023</a:t>
+              <a:t>2/6/2023</a:t>
             </a:fld>
             <a:endParaRPr lang="es-AR"/>
           </a:p>
@@ -25388,6 +25452,709 @@
           </a:p>
         </p:txBody>
       </p:sp>
+      <p:sp>
+        <p:nvSpPr>
+          <p:cNvPr id="4" name="Rectángulo 3">
+            <a:extLst>
+              <a:ext uri="{FF2B5EF4-FFF2-40B4-BE49-F238E27FC236}">
+                <a16:creationId xmlns:a16="http://schemas.microsoft.com/office/drawing/2014/main" id="{7A9074C5-81DC-19FC-02E4-7E6BDFC542ED}"/>
+              </a:ext>
+            </a:extLst>
+          </p:cNvPr>
+          <p:cNvSpPr/>
+          <p:nvPr/>
+        </p:nvSpPr>
+        <p:spPr>
+          <a:xfrm>
+            <a:off x="1689238" y="1656522"/>
+            <a:ext cx="3903179" cy="2105615"/>
+          </a:xfrm>
+          <a:prstGeom prst="rect">
+            <a:avLst/>
+          </a:prstGeom>
+          <a:ln>
+            <a:noFill/>
+          </a:ln>
+        </p:spPr>
+        <p:style>
+          <a:lnRef idx="2">
+            <a:schemeClr val="accent6"/>
+          </a:lnRef>
+          <a:fillRef idx="1">
+            <a:schemeClr val="lt1"/>
+          </a:fillRef>
+          <a:effectRef idx="0">
+            <a:schemeClr val="accent6"/>
+          </a:effectRef>
+          <a:fontRef idx="minor">
+            <a:schemeClr val="dk1"/>
+          </a:fontRef>
+        </p:style>
+        <p:txBody>
+          <a:bodyPr rtlCol="0" anchor="ctr"/>
+          <a:lstStyle/>
+          <a:p>
+            <a:pPr algn="ctr"/>
+            <a:endParaRPr lang="es-AR"/>
+          </a:p>
+        </p:txBody>
+      </p:sp>
+    </p:spTree>
+    <p:extLst>
+      <p:ext uri="{BB962C8B-B14F-4D97-AF65-F5344CB8AC3E}">
+        <p14:creationId xmlns:p14="http://schemas.microsoft.com/office/powerpoint/2010/main" val="2525390603"/>
+      </p:ext>
+    </p:extLst>
+  </p:cSld>
+  <p:clrMapOvr>
+    <a:masterClrMapping/>
+  </p:clrMapOvr>
+</p:sld>
+</file>
+
+<file path=ppt/slides/slide24.xml><?xml version="1.0" encoding="utf-8"?>
+<p:sld xmlns:a="http://schemas.openxmlformats.org/drawingml/2006/main" xmlns:r="http://schemas.openxmlformats.org/officeDocument/2006/relationships" xmlns:p="http://schemas.openxmlformats.org/presentationml/2006/main">
+  <p:cSld>
+    <p:spTree>
+      <p:nvGrpSpPr>
+        <p:cNvPr id="1" name=""/>
+        <p:cNvGrpSpPr/>
+        <p:nvPr/>
+      </p:nvGrpSpPr>
+      <p:grpSpPr>
+        <a:xfrm>
+          <a:off x="0" y="0"/>
+          <a:ext cx="0" cy="0"/>
+          <a:chOff x="0" y="0"/>
+          <a:chExt cx="0" cy="0"/>
+        </a:xfrm>
+      </p:grpSpPr>
+      <p:pic>
+        <p:nvPicPr>
+          <p:cNvPr id="12" name="Imagen 11">
+            <a:extLst>
+              <a:ext uri="{FF2B5EF4-FFF2-40B4-BE49-F238E27FC236}">
+                <a16:creationId xmlns:a16="http://schemas.microsoft.com/office/drawing/2014/main" id="{4B3C537F-34D0-876E-13EE-7A84796E9FE1}"/>
+              </a:ext>
+            </a:extLst>
+          </p:cNvPr>
+          <p:cNvPicPr>
+            <a:picLocks noChangeAspect="1"/>
+          </p:cNvPicPr>
+          <p:nvPr/>
+        </p:nvPicPr>
+        <p:blipFill>
+          <a:blip r:embed="rId2"/>
+          <a:stretch>
+            <a:fillRect/>
+          </a:stretch>
+        </p:blipFill>
+        <p:spPr>
+          <a:xfrm>
+            <a:off x="1689238" y="1519719"/>
+            <a:ext cx="7753350" cy="4257675"/>
+          </a:xfrm>
+          <a:prstGeom prst="rect">
+            <a:avLst/>
+          </a:prstGeom>
+        </p:spPr>
+      </p:pic>
+      <p:sp>
+        <p:nvSpPr>
+          <p:cNvPr id="2" name="Subtitle 1"/>
+          <p:cNvSpPr txBox="1">
+            <a:spLocks/>
+          </p:cNvSpPr>
+          <p:nvPr/>
+        </p:nvSpPr>
+        <p:spPr>
+          <a:xfrm>
+            <a:off x="296213" y="0"/>
+            <a:ext cx="11694017" cy="811369"/>
+          </a:xfrm>
+          <a:prstGeom prst="rect">
+            <a:avLst/>
+          </a:prstGeom>
+        </p:spPr>
+        <p:txBody>
+          <a:bodyPr vert="horz" lIns="91440" tIns="45720" rIns="91440" bIns="45720" rtlCol="0">
+            <a:noAutofit/>
+          </a:bodyPr>
+          <a:lstStyle>
+            <a:lvl1pPr marL="228600" indent="-228600" algn="l" defTabSz="914400" rtl="0" eaLnBrk="1" latinLnBrk="0" hangingPunct="1">
+              <a:lnSpc>
+                <a:spcPct val="120000"/>
+              </a:lnSpc>
+              <a:spcBef>
+                <a:spcPts val="1000"/>
+              </a:spcBef>
+              <a:buSzPct val="125000"/>
+              <a:buFont typeface="Arial" panose="020B0604020202020204" pitchFamily="34" charset="0"/>
+              <a:buChar char="•"/>
+              <a:defRPr sz="2400" kern="1200">
+                <a:solidFill>
+                  <a:schemeClr val="tx1"/>
+                </a:solidFill>
+                <a:latin typeface="+mn-lt"/>
+                <a:ea typeface="+mn-ea"/>
+                <a:cs typeface="+mn-cs"/>
+              </a:defRPr>
+            </a:lvl1pPr>
+            <a:lvl2pPr marL="685800" indent="-228600" algn="l" defTabSz="914400" rtl="0" eaLnBrk="1" latinLnBrk="0" hangingPunct="1">
+              <a:lnSpc>
+                <a:spcPct val="120000"/>
+              </a:lnSpc>
+              <a:spcBef>
+                <a:spcPts val="500"/>
+              </a:spcBef>
+              <a:buSzPct val="125000"/>
+              <a:buFont typeface="Arial" panose="020B0604020202020204" pitchFamily="34" charset="0"/>
+              <a:buChar char="•"/>
+              <a:defRPr sz="2000" kern="1200">
+                <a:solidFill>
+                  <a:schemeClr val="tx1"/>
+                </a:solidFill>
+                <a:latin typeface="+mn-lt"/>
+                <a:ea typeface="+mn-ea"/>
+                <a:cs typeface="+mn-cs"/>
+              </a:defRPr>
+            </a:lvl2pPr>
+            <a:lvl3pPr marL="1143000" indent="-228600" algn="l" defTabSz="914400" rtl="0" eaLnBrk="1" latinLnBrk="0" hangingPunct="1">
+              <a:lnSpc>
+                <a:spcPct val="120000"/>
+              </a:lnSpc>
+              <a:spcBef>
+                <a:spcPts val="500"/>
+              </a:spcBef>
+              <a:buSzPct val="125000"/>
+              <a:buFont typeface="Arial" panose="020B0604020202020204" pitchFamily="34" charset="0"/>
+              <a:buChar char="•"/>
+              <a:defRPr sz="1800" kern="1200">
+                <a:solidFill>
+                  <a:schemeClr val="tx1"/>
+                </a:solidFill>
+                <a:latin typeface="+mn-lt"/>
+                <a:ea typeface="+mn-ea"/>
+                <a:cs typeface="+mn-cs"/>
+              </a:defRPr>
+            </a:lvl3pPr>
+            <a:lvl4pPr marL="1600200" indent="-228600" algn="l" defTabSz="914400" rtl="0" eaLnBrk="1" latinLnBrk="0" hangingPunct="1">
+              <a:lnSpc>
+                <a:spcPct val="120000"/>
+              </a:lnSpc>
+              <a:spcBef>
+                <a:spcPts val="500"/>
+              </a:spcBef>
+              <a:buSzPct val="125000"/>
+              <a:buFont typeface="Arial" panose="020B0604020202020204" pitchFamily="34" charset="0"/>
+              <a:buChar char="•"/>
+              <a:defRPr sz="1600" kern="1200">
+                <a:solidFill>
+                  <a:schemeClr val="tx1"/>
+                </a:solidFill>
+                <a:latin typeface="+mn-lt"/>
+                <a:ea typeface="+mn-ea"/>
+                <a:cs typeface="+mn-cs"/>
+              </a:defRPr>
+            </a:lvl4pPr>
+            <a:lvl5pPr marL="2057400" indent="-228600" algn="l" defTabSz="914400" rtl="0" eaLnBrk="1" latinLnBrk="0" hangingPunct="1">
+              <a:lnSpc>
+                <a:spcPct val="120000"/>
+              </a:lnSpc>
+              <a:spcBef>
+                <a:spcPts val="500"/>
+              </a:spcBef>
+              <a:buSzPct val="125000"/>
+              <a:buFont typeface="Arial" panose="020B0604020202020204" pitchFamily="34" charset="0"/>
+              <a:buChar char="•"/>
+              <a:defRPr sz="1600" kern="1200">
+                <a:solidFill>
+                  <a:schemeClr val="tx1"/>
+                </a:solidFill>
+                <a:latin typeface="+mn-lt"/>
+                <a:ea typeface="+mn-ea"/>
+                <a:cs typeface="+mn-cs"/>
+              </a:defRPr>
+            </a:lvl5pPr>
+            <a:lvl6pPr marL="2514600" indent="-228600" algn="l" defTabSz="914400" rtl="0" eaLnBrk="1" latinLnBrk="0" hangingPunct="1">
+              <a:lnSpc>
+                <a:spcPct val="120000"/>
+              </a:lnSpc>
+              <a:spcBef>
+                <a:spcPts val="500"/>
+              </a:spcBef>
+              <a:buSzPct val="125000"/>
+              <a:buFont typeface="Arial" panose="020B0604020202020204" pitchFamily="34" charset="0"/>
+              <a:buChar char="•"/>
+              <a:defRPr sz="1400" kern="1200">
+                <a:solidFill>
+                  <a:schemeClr val="tx1"/>
+                </a:solidFill>
+                <a:latin typeface="+mn-lt"/>
+                <a:ea typeface="+mn-ea"/>
+                <a:cs typeface="+mn-cs"/>
+              </a:defRPr>
+            </a:lvl6pPr>
+            <a:lvl7pPr marL="2971800" indent="-228600" algn="l" defTabSz="914400" rtl="0" eaLnBrk="1" latinLnBrk="0" hangingPunct="1">
+              <a:lnSpc>
+                <a:spcPct val="120000"/>
+              </a:lnSpc>
+              <a:spcBef>
+                <a:spcPts val="500"/>
+              </a:spcBef>
+              <a:buSzPct val="125000"/>
+              <a:buFont typeface="Arial" panose="020B0604020202020204" pitchFamily="34" charset="0"/>
+              <a:buChar char="•"/>
+              <a:defRPr sz="1400" kern="1200">
+                <a:solidFill>
+                  <a:schemeClr val="tx1"/>
+                </a:solidFill>
+                <a:latin typeface="+mn-lt"/>
+                <a:ea typeface="+mn-ea"/>
+                <a:cs typeface="+mn-cs"/>
+              </a:defRPr>
+            </a:lvl7pPr>
+            <a:lvl8pPr marL="3429000" indent="-228600" algn="l" defTabSz="914400" rtl="0" eaLnBrk="1" latinLnBrk="0" hangingPunct="1">
+              <a:lnSpc>
+                <a:spcPct val="120000"/>
+              </a:lnSpc>
+              <a:spcBef>
+                <a:spcPts val="500"/>
+              </a:spcBef>
+              <a:buSzPct val="125000"/>
+              <a:buFont typeface="Arial" panose="020B0604020202020204" pitchFamily="34" charset="0"/>
+              <a:buChar char="•"/>
+              <a:defRPr sz="1400" kern="1200">
+                <a:solidFill>
+                  <a:schemeClr val="tx1"/>
+                </a:solidFill>
+                <a:latin typeface="+mn-lt"/>
+                <a:ea typeface="+mn-ea"/>
+                <a:cs typeface="+mn-cs"/>
+              </a:defRPr>
+            </a:lvl8pPr>
+            <a:lvl9pPr marL="3886200" indent="-228600" algn="l" defTabSz="914400" rtl="0" eaLnBrk="1" latinLnBrk="0" hangingPunct="1">
+              <a:lnSpc>
+                <a:spcPct val="120000"/>
+              </a:lnSpc>
+              <a:spcBef>
+                <a:spcPts val="500"/>
+              </a:spcBef>
+              <a:buSzPct val="125000"/>
+              <a:buFont typeface="Arial" panose="020B0604020202020204" pitchFamily="34" charset="0"/>
+              <a:buChar char="•"/>
+              <a:defRPr sz="1400" kern="1200">
+                <a:solidFill>
+                  <a:schemeClr val="tx1"/>
+                </a:solidFill>
+                <a:latin typeface="+mn-lt"/>
+                <a:ea typeface="+mn-ea"/>
+                <a:cs typeface="+mn-cs"/>
+              </a:defRPr>
+            </a:lvl9pPr>
+          </a:lstStyle>
+          <a:p>
+            <a:pPr marL="0" indent="0" algn="ctr">
+              <a:buNone/>
+            </a:pPr>
+            <a:r>
+              <a:rPr lang="es-AR" sz="3200" dirty="0" err="1">
+                <a:solidFill>
+                  <a:schemeClr val="bg1"/>
+                </a:solidFill>
+              </a:rPr>
+              <a:t>Recurrent</a:t>
+            </a:r>
+            <a:r>
+              <a:rPr lang="es-AR" sz="3200" dirty="0">
+                <a:solidFill>
+                  <a:schemeClr val="bg1"/>
+                </a:solidFill>
+              </a:rPr>
+              <a:t> Neural Network (RNN) - </a:t>
+            </a:r>
+            <a:r>
+              <a:rPr lang="es-AR" sz="3200" dirty="0" err="1">
+                <a:solidFill>
+                  <a:schemeClr val="bg1"/>
+                </a:solidFill>
+              </a:rPr>
+              <a:t>Attention</a:t>
+            </a:r>
+            <a:r>
+              <a:rPr lang="es-AR" sz="3200" dirty="0">
+                <a:solidFill>
+                  <a:schemeClr val="bg1"/>
+                </a:solidFill>
+              </a:rPr>
+              <a:t>!!</a:t>
+            </a:r>
+          </a:p>
+        </p:txBody>
+      </p:sp>
+      <mc:AlternateContent xmlns:mc="http://schemas.openxmlformats.org/markup-compatibility/2006" xmlns:a14="http://schemas.microsoft.com/office/drawing/2010/main">
+        <mc:Choice Requires="a14">
+          <p:sp>
+            <p:nvSpPr>
+              <p:cNvPr id="17" name="CuadroTexto 16">
+                <a:extLst>
+                  <a:ext uri="{FF2B5EF4-FFF2-40B4-BE49-F238E27FC236}">
+                    <a16:creationId xmlns:a16="http://schemas.microsoft.com/office/drawing/2014/main" id="{9D5CC659-0D42-1A24-0259-952EC9CEA43A}"/>
+                  </a:ext>
+                </a:extLst>
+              </p:cNvPr>
+              <p:cNvSpPr txBox="1"/>
+              <p:nvPr/>
+            </p:nvSpPr>
+            <p:spPr>
+              <a:xfrm>
+                <a:off x="4278124" y="3762137"/>
+                <a:ext cx="871330" cy="369332"/>
+              </a:xfrm>
+              <a:prstGeom prst="rect">
+                <a:avLst/>
+              </a:prstGeom>
+              <a:noFill/>
+            </p:spPr>
+            <p:txBody>
+              <a:bodyPr wrap="square">
+                <a:spAutoFit/>
+              </a:bodyPr>
+              <a:lstStyle/>
+              <a:p>
+                <a:pPr/>
+                <a14:m>
+                  <m:oMathPara xmlns:m="http://schemas.openxmlformats.org/officeDocument/2006/math">
+                    <m:oMathParaPr>
+                      <m:jc m:val="centerGroup"/>
+                    </m:oMathParaPr>
+                    <m:oMath xmlns:m="http://schemas.openxmlformats.org/officeDocument/2006/math">
+                      <m:sSub>
+                        <m:sSubPr>
+                          <m:ctrlPr>
+                            <a:rPr lang="es-AR" sz="1800" b="0" i="1" smtClean="0">
+                              <a:solidFill>
+                                <a:schemeClr val="bg1"/>
+                              </a:solidFill>
+                              <a:latin typeface="Cambria Math" panose="02040503050406030204" pitchFamily="18" charset="0"/>
+                            </a:rPr>
+                          </m:ctrlPr>
+                        </m:sSubPr>
+                        <m:e>
+                          <m:r>
+                            <a:rPr lang="es-AR" sz="1800" b="0" i="1" smtClean="0">
+                              <a:solidFill>
+                                <a:schemeClr val="bg1"/>
+                              </a:solidFill>
+                              <a:latin typeface="Cambria Math" panose="02040503050406030204" pitchFamily="18" charset="0"/>
+                            </a:rPr>
+                            <m:t>𝑧</m:t>
+                          </m:r>
+                        </m:e>
+                        <m:sub>
+                          <m:r>
+                            <a:rPr lang="es-AR" sz="1800" b="0" i="1" smtClean="0">
+                              <a:solidFill>
+                                <a:schemeClr val="bg1"/>
+                              </a:solidFill>
+                              <a:latin typeface="Cambria Math" panose="02040503050406030204" pitchFamily="18" charset="0"/>
+                            </a:rPr>
+                            <m:t>𝑡</m:t>
+                          </m:r>
+                          <m:r>
+                            <a:rPr lang="es-AR" sz="1800" b="0" i="1" smtClean="0">
+                              <a:solidFill>
+                                <a:schemeClr val="bg1"/>
+                              </a:solidFill>
+                              <a:latin typeface="Cambria Math" panose="02040503050406030204" pitchFamily="18" charset="0"/>
+                            </a:rPr>
+                            <m:t>−1</m:t>
+                          </m:r>
+                        </m:sub>
+                      </m:sSub>
+                    </m:oMath>
+                  </m:oMathPara>
+                </a14:m>
+                <a:endParaRPr lang="es-AR" dirty="0"/>
+              </a:p>
+            </p:txBody>
+          </p:sp>
+        </mc:Choice>
+        <mc:Fallback xmlns="">
+          <p:sp>
+            <p:nvSpPr>
+              <p:cNvPr id="17" name="CuadroTexto 16">
+                <a:extLst>
+                  <a:ext uri="{FF2B5EF4-FFF2-40B4-BE49-F238E27FC236}">
+                    <a16:creationId xmlns:a16="http://schemas.microsoft.com/office/drawing/2014/main" id="{9D5CC659-0D42-1A24-0259-952EC9CEA43A}"/>
+                  </a:ext>
+                </a:extLst>
+              </p:cNvPr>
+              <p:cNvSpPr txBox="1">
+                <a:spLocks noRot="1" noChangeAspect="1" noMove="1" noResize="1" noEditPoints="1" noAdjustHandles="1" noChangeArrowheads="1" noChangeShapeType="1" noTextEdit="1"/>
+              </p:cNvSpPr>
+              <p:nvPr/>
+            </p:nvSpPr>
+            <p:spPr>
+              <a:xfrm>
+                <a:off x="4278124" y="3762137"/>
+                <a:ext cx="871330" cy="369332"/>
+              </a:xfrm>
+              <a:prstGeom prst="rect">
+                <a:avLst/>
+              </a:prstGeom>
+              <a:blipFill>
+                <a:blip r:embed="rId5"/>
+                <a:stretch>
+                  <a:fillRect/>
+                </a:stretch>
+              </a:blipFill>
+            </p:spPr>
+            <p:txBody>
+              <a:bodyPr/>
+              <a:lstStyle/>
+              <a:p>
+                <a:r>
+                  <a:rPr lang="es-AR">
+                    <a:noFill/>
+                  </a:rPr>
+                  <a:t> </a:t>
+                </a:r>
+              </a:p>
+            </p:txBody>
+          </p:sp>
+        </mc:Fallback>
+      </mc:AlternateContent>
+      <p:sp>
+        <p:nvSpPr>
+          <p:cNvPr id="18" name="Subtitle 1">
+            <a:extLst>
+              <a:ext uri="{FF2B5EF4-FFF2-40B4-BE49-F238E27FC236}">
+                <a16:creationId xmlns:a16="http://schemas.microsoft.com/office/drawing/2014/main" id="{86CB9C89-7847-AD8D-1BC5-460F5AE06AD6}"/>
+              </a:ext>
+            </a:extLst>
+          </p:cNvPr>
+          <p:cNvSpPr txBox="1">
+            <a:spLocks/>
+          </p:cNvSpPr>
+          <p:nvPr/>
+        </p:nvSpPr>
+        <p:spPr>
+          <a:xfrm>
+            <a:off x="-192857" y="576184"/>
+            <a:ext cx="4906646" cy="504422"/>
+          </a:xfrm>
+          <a:prstGeom prst="rect">
+            <a:avLst/>
+          </a:prstGeom>
+        </p:spPr>
+        <p:txBody>
+          <a:bodyPr vert="horz" lIns="91440" tIns="45720" rIns="91440" bIns="45720" rtlCol="0">
+            <a:noAutofit/>
+          </a:bodyPr>
+          <a:lstStyle>
+            <a:lvl1pPr marL="228600" indent="-228600" algn="l" defTabSz="914400" rtl="0" eaLnBrk="1" latinLnBrk="0" hangingPunct="1">
+              <a:lnSpc>
+                <a:spcPct val="120000"/>
+              </a:lnSpc>
+              <a:spcBef>
+                <a:spcPts val="1000"/>
+              </a:spcBef>
+              <a:buSzPct val="125000"/>
+              <a:buFont typeface="Arial" panose="020B0604020202020204" pitchFamily="34" charset="0"/>
+              <a:buChar char="•"/>
+              <a:defRPr sz="2400" kern="1200">
+                <a:solidFill>
+                  <a:schemeClr val="tx1"/>
+                </a:solidFill>
+                <a:latin typeface="+mn-lt"/>
+                <a:ea typeface="+mn-ea"/>
+                <a:cs typeface="+mn-cs"/>
+              </a:defRPr>
+            </a:lvl1pPr>
+            <a:lvl2pPr marL="685800" indent="-228600" algn="l" defTabSz="914400" rtl="0" eaLnBrk="1" latinLnBrk="0" hangingPunct="1">
+              <a:lnSpc>
+                <a:spcPct val="120000"/>
+              </a:lnSpc>
+              <a:spcBef>
+                <a:spcPts val="500"/>
+              </a:spcBef>
+              <a:buSzPct val="125000"/>
+              <a:buFont typeface="Arial" panose="020B0604020202020204" pitchFamily="34" charset="0"/>
+              <a:buChar char="•"/>
+              <a:defRPr sz="2000" kern="1200">
+                <a:solidFill>
+                  <a:schemeClr val="tx1"/>
+                </a:solidFill>
+                <a:latin typeface="+mn-lt"/>
+                <a:ea typeface="+mn-ea"/>
+                <a:cs typeface="+mn-cs"/>
+              </a:defRPr>
+            </a:lvl2pPr>
+            <a:lvl3pPr marL="1143000" indent="-228600" algn="l" defTabSz="914400" rtl="0" eaLnBrk="1" latinLnBrk="0" hangingPunct="1">
+              <a:lnSpc>
+                <a:spcPct val="120000"/>
+              </a:lnSpc>
+              <a:spcBef>
+                <a:spcPts val="500"/>
+              </a:spcBef>
+              <a:buSzPct val="125000"/>
+              <a:buFont typeface="Arial" panose="020B0604020202020204" pitchFamily="34" charset="0"/>
+              <a:buChar char="•"/>
+              <a:defRPr sz="1800" kern="1200">
+                <a:solidFill>
+                  <a:schemeClr val="tx1"/>
+                </a:solidFill>
+                <a:latin typeface="+mn-lt"/>
+                <a:ea typeface="+mn-ea"/>
+                <a:cs typeface="+mn-cs"/>
+              </a:defRPr>
+            </a:lvl3pPr>
+            <a:lvl4pPr marL="1600200" indent="-228600" algn="l" defTabSz="914400" rtl="0" eaLnBrk="1" latinLnBrk="0" hangingPunct="1">
+              <a:lnSpc>
+                <a:spcPct val="120000"/>
+              </a:lnSpc>
+              <a:spcBef>
+                <a:spcPts val="500"/>
+              </a:spcBef>
+              <a:buSzPct val="125000"/>
+              <a:buFont typeface="Arial" panose="020B0604020202020204" pitchFamily="34" charset="0"/>
+              <a:buChar char="•"/>
+              <a:defRPr sz="1600" kern="1200">
+                <a:solidFill>
+                  <a:schemeClr val="tx1"/>
+                </a:solidFill>
+                <a:latin typeface="+mn-lt"/>
+                <a:ea typeface="+mn-ea"/>
+                <a:cs typeface="+mn-cs"/>
+              </a:defRPr>
+            </a:lvl4pPr>
+            <a:lvl5pPr marL="2057400" indent="-228600" algn="l" defTabSz="914400" rtl="0" eaLnBrk="1" latinLnBrk="0" hangingPunct="1">
+              <a:lnSpc>
+                <a:spcPct val="120000"/>
+              </a:lnSpc>
+              <a:spcBef>
+                <a:spcPts val="500"/>
+              </a:spcBef>
+              <a:buSzPct val="125000"/>
+              <a:buFont typeface="Arial" panose="020B0604020202020204" pitchFamily="34" charset="0"/>
+              <a:buChar char="•"/>
+              <a:defRPr sz="1600" kern="1200">
+                <a:solidFill>
+                  <a:schemeClr val="tx1"/>
+                </a:solidFill>
+                <a:latin typeface="+mn-lt"/>
+                <a:ea typeface="+mn-ea"/>
+                <a:cs typeface="+mn-cs"/>
+              </a:defRPr>
+            </a:lvl5pPr>
+            <a:lvl6pPr marL="2514600" indent="-228600" algn="l" defTabSz="914400" rtl="0" eaLnBrk="1" latinLnBrk="0" hangingPunct="1">
+              <a:lnSpc>
+                <a:spcPct val="120000"/>
+              </a:lnSpc>
+              <a:spcBef>
+                <a:spcPts val="500"/>
+              </a:spcBef>
+              <a:buSzPct val="125000"/>
+              <a:buFont typeface="Arial" panose="020B0604020202020204" pitchFamily="34" charset="0"/>
+              <a:buChar char="•"/>
+              <a:defRPr sz="1400" kern="1200">
+                <a:solidFill>
+                  <a:schemeClr val="tx1"/>
+                </a:solidFill>
+                <a:latin typeface="+mn-lt"/>
+                <a:ea typeface="+mn-ea"/>
+                <a:cs typeface="+mn-cs"/>
+              </a:defRPr>
+            </a:lvl6pPr>
+            <a:lvl7pPr marL="2971800" indent="-228600" algn="l" defTabSz="914400" rtl="0" eaLnBrk="1" latinLnBrk="0" hangingPunct="1">
+              <a:lnSpc>
+                <a:spcPct val="120000"/>
+              </a:lnSpc>
+              <a:spcBef>
+                <a:spcPts val="500"/>
+              </a:spcBef>
+              <a:buSzPct val="125000"/>
+              <a:buFont typeface="Arial" panose="020B0604020202020204" pitchFamily="34" charset="0"/>
+              <a:buChar char="•"/>
+              <a:defRPr sz="1400" kern="1200">
+                <a:solidFill>
+                  <a:schemeClr val="tx1"/>
+                </a:solidFill>
+                <a:latin typeface="+mn-lt"/>
+                <a:ea typeface="+mn-ea"/>
+                <a:cs typeface="+mn-cs"/>
+              </a:defRPr>
+            </a:lvl7pPr>
+            <a:lvl8pPr marL="3429000" indent="-228600" algn="l" defTabSz="914400" rtl="0" eaLnBrk="1" latinLnBrk="0" hangingPunct="1">
+              <a:lnSpc>
+                <a:spcPct val="120000"/>
+              </a:lnSpc>
+              <a:spcBef>
+                <a:spcPts val="500"/>
+              </a:spcBef>
+              <a:buSzPct val="125000"/>
+              <a:buFont typeface="Arial" panose="020B0604020202020204" pitchFamily="34" charset="0"/>
+              <a:buChar char="•"/>
+              <a:defRPr sz="1400" kern="1200">
+                <a:solidFill>
+                  <a:schemeClr val="tx1"/>
+                </a:solidFill>
+                <a:latin typeface="+mn-lt"/>
+                <a:ea typeface="+mn-ea"/>
+                <a:cs typeface="+mn-cs"/>
+              </a:defRPr>
+            </a:lvl8pPr>
+            <a:lvl9pPr marL="3886200" indent="-228600" algn="l" defTabSz="914400" rtl="0" eaLnBrk="1" latinLnBrk="0" hangingPunct="1">
+              <a:lnSpc>
+                <a:spcPct val="120000"/>
+              </a:lnSpc>
+              <a:spcBef>
+                <a:spcPts val="500"/>
+              </a:spcBef>
+              <a:buSzPct val="125000"/>
+              <a:buFont typeface="Arial" panose="020B0604020202020204" pitchFamily="34" charset="0"/>
+              <a:buChar char="•"/>
+              <a:defRPr sz="1400" kern="1200">
+                <a:solidFill>
+                  <a:schemeClr val="tx1"/>
+                </a:solidFill>
+                <a:latin typeface="+mn-lt"/>
+                <a:ea typeface="+mn-ea"/>
+                <a:cs typeface="+mn-cs"/>
+              </a:defRPr>
+            </a:lvl9pPr>
+          </a:lstStyle>
+          <a:p>
+            <a:pPr marL="0" indent="0" algn="ctr">
+              <a:buNone/>
+            </a:pPr>
+            <a:r>
+              <a:rPr lang="es-AR" b="1" dirty="0">
+                <a:solidFill>
+                  <a:srgbClr val="FF0000"/>
+                </a:solidFill>
+              </a:rPr>
+              <a:t>Ver en bibliografía</a:t>
+            </a:r>
+            <a:br>
+              <a:rPr lang="es-AR" b="1" dirty="0">
+                <a:solidFill>
+                  <a:srgbClr val="FF0000"/>
+                </a:solidFill>
+              </a:rPr>
+            </a:br>
+            <a:r>
+              <a:rPr lang="es-AR" b="1" dirty="0">
+                <a:solidFill>
+                  <a:srgbClr val="FF0000"/>
+                </a:solidFill>
+              </a:rPr>
+              <a:t>cs224n-2021-lecture07-nmt.pdf</a:t>
+            </a:r>
+          </a:p>
+        </p:txBody>
+      </p:sp>
       <mc:AlternateContent xmlns:mc="http://schemas.openxmlformats.org/markup-compatibility/2006" xmlns:a14="http://schemas.microsoft.com/office/drawing/2010/main">
         <mc:Choice Requires="a14">
           <p:sp>
@@ -25852,7 +26619,7 @@
 </p:sld>
 </file>
 
-<file path=ppt/slides/slide24.xml><?xml version="1.0" encoding="utf-8"?>
+<file path=ppt/slides/slide25.xml><?xml version="1.0" encoding="utf-8"?>
 <p:sld xmlns:a="http://schemas.openxmlformats.org/drawingml/2006/main" xmlns:r="http://schemas.openxmlformats.org/officeDocument/2006/relationships" xmlns:p="http://schemas.openxmlformats.org/presentationml/2006/main">
   <p:cSld>
     <p:spTree>
@@ -27173,7 +27940,7 @@
 </p:sld>
 </file>
 
-<file path=ppt/slides/slide25.xml><?xml version="1.0" encoding="utf-8"?>
+<file path=ppt/slides/slide26.xml><?xml version="1.0" encoding="utf-8"?>
 <p:sld xmlns:a="http://schemas.openxmlformats.org/drawingml/2006/main" xmlns:r="http://schemas.openxmlformats.org/officeDocument/2006/relationships" xmlns:p="http://schemas.openxmlformats.org/presentationml/2006/main">
   <p:cSld>
     <p:spTree>
@@ -29517,7 +30284,7 @@
 </p:sld>
 </file>
 
-<file path=ppt/slides/slide26.xml><?xml version="1.0" encoding="utf-8"?>
+<file path=ppt/slides/slide27.xml><?xml version="1.0" encoding="utf-8"?>
 <p:sld xmlns:a="http://schemas.openxmlformats.org/drawingml/2006/main" xmlns:r="http://schemas.openxmlformats.org/officeDocument/2006/relationships" xmlns:p="http://schemas.openxmlformats.org/presentationml/2006/main">
   <p:cSld>
     <p:spTree>
@@ -32257,6 +33024,93 @@
           </a:p>
         </p:txBody>
       </p:sp>
+      <p:sp>
+        <p:nvSpPr>
+          <p:cNvPr id="2" name="Flecha: hacia abajo 1">
+            <a:extLst>
+              <a:ext uri="{FF2B5EF4-FFF2-40B4-BE49-F238E27FC236}">
+                <a16:creationId xmlns:a16="http://schemas.microsoft.com/office/drawing/2014/main" id="{B10AB5D6-505D-CAA8-8105-8B43A4964934}"/>
+              </a:ext>
+            </a:extLst>
+          </p:cNvPr>
+          <p:cNvSpPr/>
+          <p:nvPr/>
+        </p:nvSpPr>
+        <p:spPr>
+          <a:xfrm>
+            <a:off x="11290852" y="2472229"/>
+            <a:ext cx="278296" cy="497426"/>
+          </a:xfrm>
+          <a:prstGeom prst="downArrow">
+            <a:avLst/>
+          </a:prstGeom>
+        </p:spPr>
+        <p:style>
+          <a:lnRef idx="2">
+            <a:schemeClr val="accent3">
+              <a:shade val="50000"/>
+            </a:schemeClr>
+          </a:lnRef>
+          <a:fillRef idx="1">
+            <a:schemeClr val="accent3"/>
+          </a:fillRef>
+          <a:effectRef idx="0">
+            <a:schemeClr val="accent3"/>
+          </a:effectRef>
+          <a:fontRef idx="minor">
+            <a:schemeClr val="lt1"/>
+          </a:fontRef>
+        </p:style>
+        <p:txBody>
+          <a:bodyPr rtlCol="0" anchor="ctr"/>
+          <a:lstStyle/>
+          <a:p>
+            <a:pPr algn="ctr"/>
+            <a:endParaRPr lang="es-AR"/>
+          </a:p>
+        </p:txBody>
+      </p:sp>
+      <p:sp>
+        <p:nvSpPr>
+          <p:cNvPr id="6" name="CuadroTexto 5">
+            <a:extLst>
+              <a:ext uri="{FF2B5EF4-FFF2-40B4-BE49-F238E27FC236}">
+                <a16:creationId xmlns:a16="http://schemas.microsoft.com/office/drawing/2014/main" id="{E8087C9F-A5D4-9287-2F64-0DFD527A245F}"/>
+              </a:ext>
+            </a:extLst>
+          </p:cNvPr>
+          <p:cNvSpPr txBox="1"/>
+          <p:nvPr/>
+        </p:nvSpPr>
+        <p:spPr>
+          <a:xfrm>
+            <a:off x="10894590" y="2023634"/>
+            <a:ext cx="1070819" cy="369332"/>
+          </a:xfrm>
+          <a:prstGeom prst="rect">
+            <a:avLst/>
+          </a:prstGeom>
+          <a:noFill/>
+        </p:spPr>
+        <p:txBody>
+          <a:bodyPr wrap="square">
+            <a:spAutoFit/>
+          </a:bodyPr>
+          <a:lstStyle/>
+          <a:p>
+            <a:pPr algn="ctr"/>
+            <a:r>
+              <a:rPr lang="es-AR" sz="1800" dirty="0">
+                <a:solidFill>
+                  <a:schemeClr val="bg1"/>
+                </a:solidFill>
+              </a:rPr>
+              <a:t>NUEVO!</a:t>
+            </a:r>
+            <a:endParaRPr lang="es-AR" dirty="0"/>
+          </a:p>
+        </p:txBody>
+      </p:sp>
     </p:spTree>
     <p:extLst>
       <p:ext uri="{BB962C8B-B14F-4D97-AF65-F5344CB8AC3E}">
@@ -32270,7 +33124,7 @@
 </p:sld>
 </file>
 
-<file path=ppt/slides/slide27.xml><?xml version="1.0" encoding="utf-8"?>
+<file path=ppt/slides/slide28.xml><?xml version="1.0" encoding="utf-8"?>
 <p:sld xmlns:a="http://schemas.openxmlformats.org/drawingml/2006/main" xmlns:r="http://schemas.openxmlformats.org/officeDocument/2006/relationships" xmlns:p="http://schemas.openxmlformats.org/presentationml/2006/main">
   <p:cSld>
     <p:spTree>
@@ -34447,7 +35301,7 @@
 </p:sld>
 </file>
 
-<file path=ppt/slides/slide28.xml><?xml version="1.0" encoding="utf-8"?>
+<file path=ppt/slides/slide29.xml><?xml version="1.0" encoding="utf-8"?>
 <p:sld xmlns:a="http://schemas.openxmlformats.org/drawingml/2006/main" xmlns:r="http://schemas.openxmlformats.org/officeDocument/2006/relationships" xmlns:p="http://schemas.openxmlformats.org/presentationml/2006/main">
   <p:cSld>
     <p:spTree>
@@ -35368,326 +36222,6 @@
     <p:extLst>
       <p:ext uri="{BB962C8B-B14F-4D97-AF65-F5344CB8AC3E}">
         <p14:creationId xmlns:p14="http://schemas.microsoft.com/office/powerpoint/2010/main" val="918011862"/>
-      </p:ext>
-    </p:extLst>
-  </p:cSld>
-  <p:clrMapOvr>
-    <a:masterClrMapping/>
-  </p:clrMapOvr>
-</p:sld>
-</file>
-
-<file path=ppt/slides/slide29.xml><?xml version="1.0" encoding="utf-8"?>
-<p:sld xmlns:a="http://schemas.openxmlformats.org/drawingml/2006/main" xmlns:r="http://schemas.openxmlformats.org/officeDocument/2006/relationships" xmlns:p="http://schemas.openxmlformats.org/presentationml/2006/main">
-  <p:cSld>
-    <p:spTree>
-      <p:nvGrpSpPr>
-        <p:cNvPr id="1" name=""/>
-        <p:cNvGrpSpPr/>
-        <p:nvPr/>
-      </p:nvGrpSpPr>
-      <p:grpSpPr>
-        <a:xfrm>
-          <a:off x="0" y="0"/>
-          <a:ext cx="0" cy="0"/>
-          <a:chOff x="0" y="0"/>
-          <a:chExt cx="0" cy="0"/>
-        </a:xfrm>
-      </p:grpSpPr>
-      <p:sp>
-        <p:nvSpPr>
-          <p:cNvPr id="2" name="Subtitle 1"/>
-          <p:cNvSpPr txBox="1">
-            <a:spLocks/>
-          </p:cNvSpPr>
-          <p:nvPr/>
-        </p:nvSpPr>
-        <p:spPr>
-          <a:xfrm>
-            <a:off x="296213" y="0"/>
-            <a:ext cx="11694017" cy="811369"/>
-          </a:xfrm>
-          <a:prstGeom prst="rect">
-            <a:avLst/>
-          </a:prstGeom>
-        </p:spPr>
-        <p:txBody>
-          <a:bodyPr vert="horz" lIns="91440" tIns="45720" rIns="91440" bIns="45720" rtlCol="0">
-            <a:noAutofit/>
-          </a:bodyPr>
-          <a:lstStyle>
-            <a:lvl1pPr marL="228600" indent="-228600" algn="l" defTabSz="914400" rtl="0" eaLnBrk="1" latinLnBrk="0" hangingPunct="1">
-              <a:lnSpc>
-                <a:spcPct val="120000"/>
-              </a:lnSpc>
-              <a:spcBef>
-                <a:spcPts val="1000"/>
-              </a:spcBef>
-              <a:buSzPct val="125000"/>
-              <a:buFont typeface="Arial" panose="020B0604020202020204" pitchFamily="34" charset="0"/>
-              <a:buChar char="•"/>
-              <a:defRPr sz="2400" kern="1200">
-                <a:solidFill>
-                  <a:schemeClr val="tx1"/>
-                </a:solidFill>
-                <a:latin typeface="+mn-lt"/>
-                <a:ea typeface="+mn-ea"/>
-                <a:cs typeface="+mn-cs"/>
-              </a:defRPr>
-            </a:lvl1pPr>
-            <a:lvl2pPr marL="685800" indent="-228600" algn="l" defTabSz="914400" rtl="0" eaLnBrk="1" latinLnBrk="0" hangingPunct="1">
-              <a:lnSpc>
-                <a:spcPct val="120000"/>
-              </a:lnSpc>
-              <a:spcBef>
-                <a:spcPts val="500"/>
-              </a:spcBef>
-              <a:buSzPct val="125000"/>
-              <a:buFont typeface="Arial" panose="020B0604020202020204" pitchFamily="34" charset="0"/>
-              <a:buChar char="•"/>
-              <a:defRPr sz="2000" kern="1200">
-                <a:solidFill>
-                  <a:schemeClr val="tx1"/>
-                </a:solidFill>
-                <a:latin typeface="+mn-lt"/>
-                <a:ea typeface="+mn-ea"/>
-                <a:cs typeface="+mn-cs"/>
-              </a:defRPr>
-            </a:lvl2pPr>
-            <a:lvl3pPr marL="1143000" indent="-228600" algn="l" defTabSz="914400" rtl="0" eaLnBrk="1" latinLnBrk="0" hangingPunct="1">
-              <a:lnSpc>
-                <a:spcPct val="120000"/>
-              </a:lnSpc>
-              <a:spcBef>
-                <a:spcPts val="500"/>
-              </a:spcBef>
-              <a:buSzPct val="125000"/>
-              <a:buFont typeface="Arial" panose="020B0604020202020204" pitchFamily="34" charset="0"/>
-              <a:buChar char="•"/>
-              <a:defRPr sz="1800" kern="1200">
-                <a:solidFill>
-                  <a:schemeClr val="tx1"/>
-                </a:solidFill>
-                <a:latin typeface="+mn-lt"/>
-                <a:ea typeface="+mn-ea"/>
-                <a:cs typeface="+mn-cs"/>
-              </a:defRPr>
-            </a:lvl3pPr>
-            <a:lvl4pPr marL="1600200" indent="-228600" algn="l" defTabSz="914400" rtl="0" eaLnBrk="1" latinLnBrk="0" hangingPunct="1">
-              <a:lnSpc>
-                <a:spcPct val="120000"/>
-              </a:lnSpc>
-              <a:spcBef>
-                <a:spcPts val="500"/>
-              </a:spcBef>
-              <a:buSzPct val="125000"/>
-              <a:buFont typeface="Arial" panose="020B0604020202020204" pitchFamily="34" charset="0"/>
-              <a:buChar char="•"/>
-              <a:defRPr sz="1600" kern="1200">
-                <a:solidFill>
-                  <a:schemeClr val="tx1"/>
-                </a:solidFill>
-                <a:latin typeface="+mn-lt"/>
-                <a:ea typeface="+mn-ea"/>
-                <a:cs typeface="+mn-cs"/>
-              </a:defRPr>
-            </a:lvl4pPr>
-            <a:lvl5pPr marL="2057400" indent="-228600" algn="l" defTabSz="914400" rtl="0" eaLnBrk="1" latinLnBrk="0" hangingPunct="1">
-              <a:lnSpc>
-                <a:spcPct val="120000"/>
-              </a:lnSpc>
-              <a:spcBef>
-                <a:spcPts val="500"/>
-              </a:spcBef>
-              <a:buSzPct val="125000"/>
-              <a:buFont typeface="Arial" panose="020B0604020202020204" pitchFamily="34" charset="0"/>
-              <a:buChar char="•"/>
-              <a:defRPr sz="1600" kern="1200">
-                <a:solidFill>
-                  <a:schemeClr val="tx1"/>
-                </a:solidFill>
-                <a:latin typeface="+mn-lt"/>
-                <a:ea typeface="+mn-ea"/>
-                <a:cs typeface="+mn-cs"/>
-              </a:defRPr>
-            </a:lvl5pPr>
-            <a:lvl6pPr marL="2514600" indent="-228600" algn="l" defTabSz="914400" rtl="0" eaLnBrk="1" latinLnBrk="0" hangingPunct="1">
-              <a:lnSpc>
-                <a:spcPct val="120000"/>
-              </a:lnSpc>
-              <a:spcBef>
-                <a:spcPts val="500"/>
-              </a:spcBef>
-              <a:buSzPct val="125000"/>
-              <a:buFont typeface="Arial" panose="020B0604020202020204" pitchFamily="34" charset="0"/>
-              <a:buChar char="•"/>
-              <a:defRPr sz="1400" kern="1200">
-                <a:solidFill>
-                  <a:schemeClr val="tx1"/>
-                </a:solidFill>
-                <a:latin typeface="+mn-lt"/>
-                <a:ea typeface="+mn-ea"/>
-                <a:cs typeface="+mn-cs"/>
-              </a:defRPr>
-            </a:lvl6pPr>
-            <a:lvl7pPr marL="2971800" indent="-228600" algn="l" defTabSz="914400" rtl="0" eaLnBrk="1" latinLnBrk="0" hangingPunct="1">
-              <a:lnSpc>
-                <a:spcPct val="120000"/>
-              </a:lnSpc>
-              <a:spcBef>
-                <a:spcPts val="500"/>
-              </a:spcBef>
-              <a:buSzPct val="125000"/>
-              <a:buFont typeface="Arial" panose="020B0604020202020204" pitchFamily="34" charset="0"/>
-              <a:buChar char="•"/>
-              <a:defRPr sz="1400" kern="1200">
-                <a:solidFill>
-                  <a:schemeClr val="tx1"/>
-                </a:solidFill>
-                <a:latin typeface="+mn-lt"/>
-                <a:ea typeface="+mn-ea"/>
-                <a:cs typeface="+mn-cs"/>
-              </a:defRPr>
-            </a:lvl7pPr>
-            <a:lvl8pPr marL="3429000" indent="-228600" algn="l" defTabSz="914400" rtl="0" eaLnBrk="1" latinLnBrk="0" hangingPunct="1">
-              <a:lnSpc>
-                <a:spcPct val="120000"/>
-              </a:lnSpc>
-              <a:spcBef>
-                <a:spcPts val="500"/>
-              </a:spcBef>
-              <a:buSzPct val="125000"/>
-              <a:buFont typeface="Arial" panose="020B0604020202020204" pitchFamily="34" charset="0"/>
-              <a:buChar char="•"/>
-              <a:defRPr sz="1400" kern="1200">
-                <a:solidFill>
-                  <a:schemeClr val="tx1"/>
-                </a:solidFill>
-                <a:latin typeface="+mn-lt"/>
-                <a:ea typeface="+mn-ea"/>
-                <a:cs typeface="+mn-cs"/>
-              </a:defRPr>
-            </a:lvl8pPr>
-            <a:lvl9pPr marL="3886200" indent="-228600" algn="l" defTabSz="914400" rtl="0" eaLnBrk="1" latinLnBrk="0" hangingPunct="1">
-              <a:lnSpc>
-                <a:spcPct val="120000"/>
-              </a:lnSpc>
-              <a:spcBef>
-                <a:spcPts val="500"/>
-              </a:spcBef>
-              <a:buSzPct val="125000"/>
-              <a:buFont typeface="Arial" panose="020B0604020202020204" pitchFamily="34" charset="0"/>
-              <a:buChar char="•"/>
-              <a:defRPr sz="1400" kern="1200">
-                <a:solidFill>
-                  <a:schemeClr val="tx1"/>
-                </a:solidFill>
-                <a:latin typeface="+mn-lt"/>
-                <a:ea typeface="+mn-ea"/>
-                <a:cs typeface="+mn-cs"/>
-              </a:defRPr>
-            </a:lvl9pPr>
-          </a:lstStyle>
-          <a:p>
-            <a:pPr marL="0" indent="0" algn="ctr">
-              <a:buNone/>
-            </a:pPr>
-            <a:r>
-              <a:rPr lang="es-AR" sz="3200" dirty="0" err="1">
-                <a:solidFill>
-                  <a:schemeClr val="bg1"/>
-                </a:solidFill>
-              </a:rPr>
-              <a:t>Recurrent</a:t>
-            </a:r>
-            <a:r>
-              <a:rPr lang="es-AR" sz="3200" dirty="0">
-                <a:solidFill>
-                  <a:schemeClr val="bg1"/>
-                </a:solidFill>
-              </a:rPr>
-              <a:t> Neural Network (RNN)</a:t>
-            </a:r>
-          </a:p>
-          <a:p>
-            <a:pPr marL="0" indent="0" algn="ctr">
-              <a:buNone/>
-            </a:pPr>
-            <a:r>
-              <a:rPr lang="es-AR" sz="3200" dirty="0" err="1">
-                <a:solidFill>
-                  <a:schemeClr val="bg1"/>
-                </a:solidFill>
-              </a:rPr>
-              <a:t>Attention</a:t>
-            </a:r>
-            <a:r>
-              <a:rPr lang="es-AR" sz="3200" dirty="0">
-                <a:solidFill>
-                  <a:schemeClr val="bg1"/>
-                </a:solidFill>
-              </a:rPr>
-              <a:t> se aplica a mas que NLP (o traducción)</a:t>
-            </a:r>
-          </a:p>
-        </p:txBody>
-      </p:sp>
-      <p:pic>
-        <p:nvPicPr>
-          <p:cNvPr id="3" name="Picture 2"/>
-          <p:cNvPicPr>
-            <a:picLocks noChangeAspect="1"/>
-          </p:cNvPicPr>
-          <p:nvPr/>
-        </p:nvPicPr>
-        <p:blipFill>
-          <a:blip r:embed="rId2"/>
-          <a:stretch>
-            <a:fillRect/>
-          </a:stretch>
-        </p:blipFill>
-        <p:spPr>
-          <a:xfrm>
-            <a:off x="934554" y="1332190"/>
-            <a:ext cx="10082481" cy="5137699"/>
-          </a:xfrm>
-          <a:prstGeom prst="rect">
-            <a:avLst/>
-          </a:prstGeom>
-        </p:spPr>
-      </p:pic>
-      <p:sp>
-        <p:nvSpPr>
-          <p:cNvPr id="4" name="Rectangle 3"/>
-          <p:cNvSpPr/>
-          <p:nvPr/>
-        </p:nvSpPr>
-        <p:spPr>
-          <a:xfrm>
-            <a:off x="1614149" y="6488668"/>
-            <a:ext cx="8723290" cy="369332"/>
-          </a:xfrm>
-          <a:prstGeom prst="rect">
-            <a:avLst/>
-          </a:prstGeom>
-        </p:spPr>
-        <p:txBody>
-          <a:bodyPr wrap="square">
-            <a:spAutoFit/>
-          </a:bodyPr>
-          <a:lstStyle/>
-          <a:p>
-            <a:r>
-              <a:rPr lang="es-AR" dirty="0"/>
-              <a:t>http://cs231n.stanford.edu/slides/2017/cs231n_2017_lecture10.pdf</a:t>
-            </a:r>
-          </a:p>
-        </p:txBody>
-      </p:sp>
-    </p:spTree>
-    <p:extLst>
-      <p:ext uri="{BB962C8B-B14F-4D97-AF65-F5344CB8AC3E}">
-        <p14:creationId xmlns:p14="http://schemas.microsoft.com/office/powerpoint/2010/main" val="2959708940"/>
       </p:ext>
     </p:extLst>
   </p:cSld>
@@ -37714,6 +38248,326 @@
 </file>
 
 <file path=ppt/slides/slide30.xml><?xml version="1.0" encoding="utf-8"?>
+<p:sld xmlns:a="http://schemas.openxmlformats.org/drawingml/2006/main" xmlns:r="http://schemas.openxmlformats.org/officeDocument/2006/relationships" xmlns:p="http://schemas.openxmlformats.org/presentationml/2006/main">
+  <p:cSld>
+    <p:spTree>
+      <p:nvGrpSpPr>
+        <p:cNvPr id="1" name=""/>
+        <p:cNvGrpSpPr/>
+        <p:nvPr/>
+      </p:nvGrpSpPr>
+      <p:grpSpPr>
+        <a:xfrm>
+          <a:off x="0" y="0"/>
+          <a:ext cx="0" cy="0"/>
+          <a:chOff x="0" y="0"/>
+          <a:chExt cx="0" cy="0"/>
+        </a:xfrm>
+      </p:grpSpPr>
+      <p:sp>
+        <p:nvSpPr>
+          <p:cNvPr id="2" name="Subtitle 1"/>
+          <p:cNvSpPr txBox="1">
+            <a:spLocks/>
+          </p:cNvSpPr>
+          <p:nvPr/>
+        </p:nvSpPr>
+        <p:spPr>
+          <a:xfrm>
+            <a:off x="296213" y="0"/>
+            <a:ext cx="11694017" cy="811369"/>
+          </a:xfrm>
+          <a:prstGeom prst="rect">
+            <a:avLst/>
+          </a:prstGeom>
+        </p:spPr>
+        <p:txBody>
+          <a:bodyPr vert="horz" lIns="91440" tIns="45720" rIns="91440" bIns="45720" rtlCol="0">
+            <a:noAutofit/>
+          </a:bodyPr>
+          <a:lstStyle>
+            <a:lvl1pPr marL="228600" indent="-228600" algn="l" defTabSz="914400" rtl="0" eaLnBrk="1" latinLnBrk="0" hangingPunct="1">
+              <a:lnSpc>
+                <a:spcPct val="120000"/>
+              </a:lnSpc>
+              <a:spcBef>
+                <a:spcPts val="1000"/>
+              </a:spcBef>
+              <a:buSzPct val="125000"/>
+              <a:buFont typeface="Arial" panose="020B0604020202020204" pitchFamily="34" charset="0"/>
+              <a:buChar char="•"/>
+              <a:defRPr sz="2400" kern="1200">
+                <a:solidFill>
+                  <a:schemeClr val="tx1"/>
+                </a:solidFill>
+                <a:latin typeface="+mn-lt"/>
+                <a:ea typeface="+mn-ea"/>
+                <a:cs typeface="+mn-cs"/>
+              </a:defRPr>
+            </a:lvl1pPr>
+            <a:lvl2pPr marL="685800" indent="-228600" algn="l" defTabSz="914400" rtl="0" eaLnBrk="1" latinLnBrk="0" hangingPunct="1">
+              <a:lnSpc>
+                <a:spcPct val="120000"/>
+              </a:lnSpc>
+              <a:spcBef>
+                <a:spcPts val="500"/>
+              </a:spcBef>
+              <a:buSzPct val="125000"/>
+              <a:buFont typeface="Arial" panose="020B0604020202020204" pitchFamily="34" charset="0"/>
+              <a:buChar char="•"/>
+              <a:defRPr sz="2000" kern="1200">
+                <a:solidFill>
+                  <a:schemeClr val="tx1"/>
+                </a:solidFill>
+                <a:latin typeface="+mn-lt"/>
+                <a:ea typeface="+mn-ea"/>
+                <a:cs typeface="+mn-cs"/>
+              </a:defRPr>
+            </a:lvl2pPr>
+            <a:lvl3pPr marL="1143000" indent="-228600" algn="l" defTabSz="914400" rtl="0" eaLnBrk="1" latinLnBrk="0" hangingPunct="1">
+              <a:lnSpc>
+                <a:spcPct val="120000"/>
+              </a:lnSpc>
+              <a:spcBef>
+                <a:spcPts val="500"/>
+              </a:spcBef>
+              <a:buSzPct val="125000"/>
+              <a:buFont typeface="Arial" panose="020B0604020202020204" pitchFamily="34" charset="0"/>
+              <a:buChar char="•"/>
+              <a:defRPr sz="1800" kern="1200">
+                <a:solidFill>
+                  <a:schemeClr val="tx1"/>
+                </a:solidFill>
+                <a:latin typeface="+mn-lt"/>
+                <a:ea typeface="+mn-ea"/>
+                <a:cs typeface="+mn-cs"/>
+              </a:defRPr>
+            </a:lvl3pPr>
+            <a:lvl4pPr marL="1600200" indent="-228600" algn="l" defTabSz="914400" rtl="0" eaLnBrk="1" latinLnBrk="0" hangingPunct="1">
+              <a:lnSpc>
+                <a:spcPct val="120000"/>
+              </a:lnSpc>
+              <a:spcBef>
+                <a:spcPts val="500"/>
+              </a:spcBef>
+              <a:buSzPct val="125000"/>
+              <a:buFont typeface="Arial" panose="020B0604020202020204" pitchFamily="34" charset="0"/>
+              <a:buChar char="•"/>
+              <a:defRPr sz="1600" kern="1200">
+                <a:solidFill>
+                  <a:schemeClr val="tx1"/>
+                </a:solidFill>
+                <a:latin typeface="+mn-lt"/>
+                <a:ea typeface="+mn-ea"/>
+                <a:cs typeface="+mn-cs"/>
+              </a:defRPr>
+            </a:lvl4pPr>
+            <a:lvl5pPr marL="2057400" indent="-228600" algn="l" defTabSz="914400" rtl="0" eaLnBrk="1" latinLnBrk="0" hangingPunct="1">
+              <a:lnSpc>
+                <a:spcPct val="120000"/>
+              </a:lnSpc>
+              <a:spcBef>
+                <a:spcPts val="500"/>
+              </a:spcBef>
+              <a:buSzPct val="125000"/>
+              <a:buFont typeface="Arial" panose="020B0604020202020204" pitchFamily="34" charset="0"/>
+              <a:buChar char="•"/>
+              <a:defRPr sz="1600" kern="1200">
+                <a:solidFill>
+                  <a:schemeClr val="tx1"/>
+                </a:solidFill>
+                <a:latin typeface="+mn-lt"/>
+                <a:ea typeface="+mn-ea"/>
+                <a:cs typeface="+mn-cs"/>
+              </a:defRPr>
+            </a:lvl5pPr>
+            <a:lvl6pPr marL="2514600" indent="-228600" algn="l" defTabSz="914400" rtl="0" eaLnBrk="1" latinLnBrk="0" hangingPunct="1">
+              <a:lnSpc>
+                <a:spcPct val="120000"/>
+              </a:lnSpc>
+              <a:spcBef>
+                <a:spcPts val="500"/>
+              </a:spcBef>
+              <a:buSzPct val="125000"/>
+              <a:buFont typeface="Arial" panose="020B0604020202020204" pitchFamily="34" charset="0"/>
+              <a:buChar char="•"/>
+              <a:defRPr sz="1400" kern="1200">
+                <a:solidFill>
+                  <a:schemeClr val="tx1"/>
+                </a:solidFill>
+                <a:latin typeface="+mn-lt"/>
+                <a:ea typeface="+mn-ea"/>
+                <a:cs typeface="+mn-cs"/>
+              </a:defRPr>
+            </a:lvl6pPr>
+            <a:lvl7pPr marL="2971800" indent="-228600" algn="l" defTabSz="914400" rtl="0" eaLnBrk="1" latinLnBrk="0" hangingPunct="1">
+              <a:lnSpc>
+                <a:spcPct val="120000"/>
+              </a:lnSpc>
+              <a:spcBef>
+                <a:spcPts val="500"/>
+              </a:spcBef>
+              <a:buSzPct val="125000"/>
+              <a:buFont typeface="Arial" panose="020B0604020202020204" pitchFamily="34" charset="0"/>
+              <a:buChar char="•"/>
+              <a:defRPr sz="1400" kern="1200">
+                <a:solidFill>
+                  <a:schemeClr val="tx1"/>
+                </a:solidFill>
+                <a:latin typeface="+mn-lt"/>
+                <a:ea typeface="+mn-ea"/>
+                <a:cs typeface="+mn-cs"/>
+              </a:defRPr>
+            </a:lvl7pPr>
+            <a:lvl8pPr marL="3429000" indent="-228600" algn="l" defTabSz="914400" rtl="0" eaLnBrk="1" latinLnBrk="0" hangingPunct="1">
+              <a:lnSpc>
+                <a:spcPct val="120000"/>
+              </a:lnSpc>
+              <a:spcBef>
+                <a:spcPts val="500"/>
+              </a:spcBef>
+              <a:buSzPct val="125000"/>
+              <a:buFont typeface="Arial" panose="020B0604020202020204" pitchFamily="34" charset="0"/>
+              <a:buChar char="•"/>
+              <a:defRPr sz="1400" kern="1200">
+                <a:solidFill>
+                  <a:schemeClr val="tx1"/>
+                </a:solidFill>
+                <a:latin typeface="+mn-lt"/>
+                <a:ea typeface="+mn-ea"/>
+                <a:cs typeface="+mn-cs"/>
+              </a:defRPr>
+            </a:lvl8pPr>
+            <a:lvl9pPr marL="3886200" indent="-228600" algn="l" defTabSz="914400" rtl="0" eaLnBrk="1" latinLnBrk="0" hangingPunct="1">
+              <a:lnSpc>
+                <a:spcPct val="120000"/>
+              </a:lnSpc>
+              <a:spcBef>
+                <a:spcPts val="500"/>
+              </a:spcBef>
+              <a:buSzPct val="125000"/>
+              <a:buFont typeface="Arial" panose="020B0604020202020204" pitchFamily="34" charset="0"/>
+              <a:buChar char="•"/>
+              <a:defRPr sz="1400" kern="1200">
+                <a:solidFill>
+                  <a:schemeClr val="tx1"/>
+                </a:solidFill>
+                <a:latin typeface="+mn-lt"/>
+                <a:ea typeface="+mn-ea"/>
+                <a:cs typeface="+mn-cs"/>
+              </a:defRPr>
+            </a:lvl9pPr>
+          </a:lstStyle>
+          <a:p>
+            <a:pPr marL="0" indent="0" algn="ctr">
+              <a:buNone/>
+            </a:pPr>
+            <a:r>
+              <a:rPr lang="es-AR" sz="3200" dirty="0" err="1">
+                <a:solidFill>
+                  <a:schemeClr val="bg1"/>
+                </a:solidFill>
+              </a:rPr>
+              <a:t>Recurrent</a:t>
+            </a:r>
+            <a:r>
+              <a:rPr lang="es-AR" sz="3200" dirty="0">
+                <a:solidFill>
+                  <a:schemeClr val="bg1"/>
+                </a:solidFill>
+              </a:rPr>
+              <a:t> Neural Network (RNN)</a:t>
+            </a:r>
+          </a:p>
+          <a:p>
+            <a:pPr marL="0" indent="0" algn="ctr">
+              <a:buNone/>
+            </a:pPr>
+            <a:r>
+              <a:rPr lang="es-AR" sz="3200" dirty="0" err="1">
+                <a:solidFill>
+                  <a:schemeClr val="bg1"/>
+                </a:solidFill>
+              </a:rPr>
+              <a:t>Attention</a:t>
+            </a:r>
+            <a:r>
+              <a:rPr lang="es-AR" sz="3200" dirty="0">
+                <a:solidFill>
+                  <a:schemeClr val="bg1"/>
+                </a:solidFill>
+              </a:rPr>
+              <a:t> se aplica a mas que NLP (o traducción)</a:t>
+            </a:r>
+          </a:p>
+        </p:txBody>
+      </p:sp>
+      <p:pic>
+        <p:nvPicPr>
+          <p:cNvPr id="3" name="Picture 2"/>
+          <p:cNvPicPr>
+            <a:picLocks noChangeAspect="1"/>
+          </p:cNvPicPr>
+          <p:nvPr/>
+        </p:nvPicPr>
+        <p:blipFill>
+          <a:blip r:embed="rId2"/>
+          <a:stretch>
+            <a:fillRect/>
+          </a:stretch>
+        </p:blipFill>
+        <p:spPr>
+          <a:xfrm>
+            <a:off x="934554" y="1332190"/>
+            <a:ext cx="10082481" cy="5137699"/>
+          </a:xfrm>
+          <a:prstGeom prst="rect">
+            <a:avLst/>
+          </a:prstGeom>
+        </p:spPr>
+      </p:pic>
+      <p:sp>
+        <p:nvSpPr>
+          <p:cNvPr id="4" name="Rectangle 3"/>
+          <p:cNvSpPr/>
+          <p:nvPr/>
+        </p:nvSpPr>
+        <p:spPr>
+          <a:xfrm>
+            <a:off x="1614149" y="6488668"/>
+            <a:ext cx="8723290" cy="369332"/>
+          </a:xfrm>
+          <a:prstGeom prst="rect">
+            <a:avLst/>
+          </a:prstGeom>
+        </p:spPr>
+        <p:txBody>
+          <a:bodyPr wrap="square">
+            <a:spAutoFit/>
+          </a:bodyPr>
+          <a:lstStyle/>
+          <a:p>
+            <a:r>
+              <a:rPr lang="es-AR" dirty="0"/>
+              <a:t>http://cs231n.stanford.edu/slides/2017/cs231n_2017_lecture10.pdf</a:t>
+            </a:r>
+          </a:p>
+        </p:txBody>
+      </p:sp>
+    </p:spTree>
+    <p:extLst>
+      <p:ext uri="{BB962C8B-B14F-4D97-AF65-F5344CB8AC3E}">
+        <p14:creationId xmlns:p14="http://schemas.microsoft.com/office/powerpoint/2010/main" val="2959708940"/>
+      </p:ext>
+    </p:extLst>
+  </p:cSld>
+  <p:clrMapOvr>
+    <a:masterClrMapping/>
+  </p:clrMapOvr>
+</p:sld>
+</file>
+
+<file path=ppt/slides/slide31.xml><?xml version="1.0" encoding="utf-8"?>
 <p:sld xmlns:a="http://schemas.openxmlformats.org/drawingml/2006/main" xmlns:r="http://schemas.openxmlformats.org/officeDocument/2006/relationships" xmlns:p="http://schemas.openxmlformats.org/presentationml/2006/main">
   <p:cSld>
     <p:spTree>

</xml_diff>